<commit_message>
fix report and presentation
</commit_message>
<xml_diff>
--- a/final report and presentation/JavaPresentation.pptx
+++ b/final report and presentation/JavaPresentation.pptx
@@ -1,24 +1,24 @@
 
 <file path=ppt/presentation.xml><?xml version="1.0" encoding="utf-8"?>
-<p:presentation xmlns:a="http://schemas.openxmlformats.org/drawingml/2006/main" xmlns:r="http://schemas.openxmlformats.org/officeDocument/2006/relationships" xmlns:p="http://schemas.openxmlformats.org/presentationml/2006/main">
+<p:presentation xmlns:a="http://schemas.openxmlformats.org/drawingml/2006/main" xmlns:r="http://schemas.openxmlformats.org/officeDocument/2006/relationships" xmlns:p="http://schemas.openxmlformats.org/presentationml/2006/main" saveSubsetFonts="1">
   <p:sldMasterIdLst>
-    <p:sldMasterId id="2147483648" r:id="rId5"/>
+    <p:sldMasterId id="2147483648" r:id="rId1"/>
   </p:sldMasterIdLst>
   <p:notesMasterIdLst>
-    <p:notesMasterId r:id="rId7"/>
+    <p:notesMasterId r:id="rId13"/>
   </p:notesMasterIdLst>
   <p:sldIdLst>
-    <p:sldId id="256" r:id="rId8"/>
-    <p:sldId id="257" r:id="rId9"/>
-    <p:sldId id="258" r:id="rId10"/>
-    <p:sldId id="259" r:id="rId11"/>
-    <p:sldId id="260" r:id="rId12"/>
-    <p:sldId id="261" r:id="rId13"/>
-    <p:sldId id="262" r:id="rId14"/>
-    <p:sldId id="263" r:id="rId15"/>
-    <p:sldId id="264" r:id="rId16"/>
-    <p:sldId id="265" r:id="rId17"/>
-    <p:sldId id="266" r:id="rId18"/>
+    <p:sldId id="256" r:id="rId2"/>
+    <p:sldId id="257" r:id="rId3"/>
+    <p:sldId id="258" r:id="rId4"/>
+    <p:sldId id="259" r:id="rId5"/>
+    <p:sldId id="260" r:id="rId6"/>
+    <p:sldId id="261" r:id="rId7"/>
+    <p:sldId id="262" r:id="rId8"/>
+    <p:sldId id="263" r:id="rId9"/>
+    <p:sldId id="264" r:id="rId10"/>
+    <p:sldId id="265" r:id="rId11"/>
+    <p:sldId id="266" r:id="rId12"/>
   </p:sldIdLst>
   <p:sldSz cx="12192000" cy="6858000"/>
   <p:notesSz cx="6858000" cy="9144000"/>
@@ -38,7 +38,7 @@
       <a:buFontTx/>
       <a:buNone/>
       <a:tabLst/>
-      <a:defRPr b="0" baseline="0" cap="none" i="0" spc="0" strike="noStrike" sz="1800" u="none" kumimoji="0" normalizeH="0">
+      <a:defRPr kumimoji="0" sz="1800" b="0" i="0" u="none" strike="noStrike" cap="none" spc="0" normalizeH="0" baseline="0">
         <a:ln>
           <a:noFill/>
         </a:ln>
@@ -64,7 +64,7 @@
       <a:buFontTx/>
       <a:buNone/>
       <a:tabLst/>
-      <a:defRPr b="0" baseline="0" cap="none" i="0" spc="0" strike="noStrike" sz="1800" u="none" kumimoji="0" normalizeH="0">
+      <a:defRPr kumimoji="0" sz="1800" b="0" i="0" u="none" strike="noStrike" cap="none" spc="0" normalizeH="0" baseline="0">
         <a:ln>
           <a:noFill/>
         </a:ln>
@@ -94,7 +94,7 @@
       <a:buFontTx/>
       <a:buNone/>
       <a:tabLst/>
-      <a:defRPr b="0" baseline="0" cap="none" i="0" spc="0" strike="noStrike" sz="1800" u="none" kumimoji="0" normalizeH="0">
+      <a:defRPr kumimoji="0" sz="1800" b="0" i="0" u="none" strike="noStrike" cap="none" spc="0" normalizeH="0" baseline="0">
         <a:ln>
           <a:noFill/>
         </a:ln>
@@ -124,7 +124,7 @@
       <a:buFontTx/>
       <a:buNone/>
       <a:tabLst/>
-      <a:defRPr b="0" baseline="0" cap="none" i="0" spc="0" strike="noStrike" sz="1800" u="none" kumimoji="0" normalizeH="0">
+      <a:defRPr kumimoji="0" sz="1800" b="0" i="0" u="none" strike="noStrike" cap="none" spc="0" normalizeH="0" baseline="0">
         <a:ln>
           <a:noFill/>
         </a:ln>
@@ -154,7 +154,7 @@
       <a:buFontTx/>
       <a:buNone/>
       <a:tabLst/>
-      <a:defRPr b="0" baseline="0" cap="none" i="0" spc="0" strike="noStrike" sz="1800" u="none" kumimoji="0" normalizeH="0">
+      <a:defRPr kumimoji="0" sz="1800" b="0" i="0" u="none" strike="noStrike" cap="none" spc="0" normalizeH="0" baseline="0">
         <a:ln>
           <a:noFill/>
         </a:ln>
@@ -184,7 +184,7 @@
       <a:buFontTx/>
       <a:buNone/>
       <a:tabLst/>
-      <a:defRPr b="0" baseline="0" cap="none" i="0" spc="0" strike="noStrike" sz="1800" u="none" kumimoji="0" normalizeH="0">
+      <a:defRPr kumimoji="0" sz="1800" b="0" i="0" u="none" strike="noStrike" cap="none" spc="0" normalizeH="0" baseline="0">
         <a:ln>
           <a:noFill/>
         </a:ln>
@@ -214,7 +214,7 @@
       <a:buFontTx/>
       <a:buNone/>
       <a:tabLst/>
-      <a:defRPr b="0" baseline="0" cap="none" i="0" spc="0" strike="noStrike" sz="1800" u="none" kumimoji="0" normalizeH="0">
+      <a:defRPr kumimoji="0" sz="1800" b="0" i="0" u="none" strike="noStrike" cap="none" spc="0" normalizeH="0" baseline="0">
         <a:ln>
           <a:noFill/>
         </a:ln>
@@ -244,7 +244,7 @@
       <a:buFontTx/>
       <a:buNone/>
       <a:tabLst/>
-      <a:defRPr b="0" baseline="0" cap="none" i="0" spc="0" strike="noStrike" sz="1800" u="none" kumimoji="0" normalizeH="0">
+      <a:defRPr kumimoji="0" sz="1800" b="0" i="0" u="none" strike="noStrike" cap="none" spc="0" normalizeH="0" baseline="0">
         <a:ln>
           <a:noFill/>
         </a:ln>
@@ -274,7 +274,7 @@
       <a:buFontTx/>
       <a:buNone/>
       <a:tabLst/>
-      <a:defRPr b="0" baseline="0" cap="none" i="0" spc="0" strike="noStrike" sz="1800" u="none" kumimoji="0" normalizeH="0">
+      <a:defRPr kumimoji="0" sz="1800" b="0" i="0" u="none" strike="noStrike" cap="none" spc="0" normalizeH="0" baseline="0">
         <a:ln>
           <a:noFill/>
         </a:ln>
@@ -304,7 +304,7 @@
       <a:buFontTx/>
       <a:buNone/>
       <a:tabLst/>
-      <a:defRPr b="0" baseline="0" cap="none" i="0" spc="0" strike="noStrike" sz="1800" u="none" kumimoji="0" normalizeH="0">
+      <a:defRPr kumimoji="0" sz="1800" b="0" i="0" u="none" strike="noStrike" cap="none" spc="0" normalizeH="0" baseline="0">
         <a:ln>
           <a:noFill/>
         </a:ln>
@@ -323,13 +323,14 @@
 </p:presentation>
 </file>
 
-<file path=ppt/commentAuthors.xml><?xml version="1.0" encoding="utf-8"?>
-<p:cmAuthorLst xmlns:a="http://schemas.openxmlformats.org/drawingml/2006/main" xmlns:r="http://schemas.openxmlformats.org/officeDocument/2006/relationships" xmlns:p="http://schemas.openxmlformats.org/presentationml/2006/main"/>
-</file>
-
 <file path=ppt/notesMasters/notesMaster1.xml><?xml version="1.0" encoding="utf-8"?>
 <p:notesMaster xmlns:a="http://schemas.openxmlformats.org/drawingml/2006/main" xmlns:r="http://schemas.openxmlformats.org/officeDocument/2006/relationships" xmlns:p="http://schemas.openxmlformats.org/presentationml/2006/main">
   <p:cSld>
+    <p:bg>
+      <p:bgRef idx="1001">
+        <a:schemeClr val="bg1"/>
+      </p:bgRef>
+    </p:bg>
     <p:spTree>
       <p:nvGrpSpPr>
         <p:cNvPr id="1" name=""/>
@@ -347,7 +348,9 @@
       <p:sp>
         <p:nvSpPr>
           <p:cNvPr id="106" name="Shape 106"/>
-          <p:cNvSpPr/>
+          <p:cNvSpPr>
+            <a:spLocks noGrp="1" noRot="1" noChangeAspect="1"/>
+          </p:cNvSpPr>
           <p:nvPr>
             <p:ph type="sldImg"/>
           </p:nvPr>
@@ -365,14 +368,16 @@
           <a:bodyPr/>
           <a:lstStyle/>
           <a:p>
-            <a:pPr/>
+            <a:endParaRPr/>
           </a:p>
         </p:txBody>
       </p:sp>
       <p:sp>
         <p:nvSpPr>
           <p:cNvPr id="107" name="Shape 107"/>
-          <p:cNvSpPr/>
+          <p:cNvSpPr>
+            <a:spLocks noGrp="1"/>
+          </p:cNvSpPr>
           <p:nvPr>
             <p:ph type="body" sz="quarter" idx="1"/>
           </p:nvPr>
@@ -390,11 +395,16 @@
           <a:bodyPr/>
           <a:lstStyle/>
           <a:p>
-            <a:pPr/>
+            <a:endParaRPr/>
           </a:p>
         </p:txBody>
       </p:sp>
     </p:spTree>
+    <p:extLst>
+      <p:ext uri="{BB962C8B-B14F-4D97-AF65-F5344CB8AC3E}">
+        <p14:creationId xmlns:p14="http://schemas.microsoft.com/office/powerpoint/2010/main" val="588064213"/>
+      </p:ext>
+    </p:extLst>
   </p:cSld>
   <p:clrMap bg1="lt1" tx1="dk1" bg2="lt2" tx2="dk2" accent1="accent1" accent2="accent2" accent3="accent3" accent4="accent4" accent5="accent5" accent6="accent6" hlink="hlink" folHlink="folHlink"/>
   <p:notesStyle>
@@ -502,7 +512,7 @@
 </file>
 
 <file path=ppt/slideLayouts/slideLayout1.xml><?xml version="1.0" encoding="utf-8"?>
-<p:sldLayout xmlns:a="http://schemas.openxmlformats.org/drawingml/2006/main" xmlns:r="http://schemas.openxmlformats.org/officeDocument/2006/relationships" xmlns:p="http://schemas.openxmlformats.org/presentationml/2006/main" type="title" showMasterSp="1" showMasterPhAnim="1">
+<p:sldLayout xmlns:a="http://schemas.openxmlformats.org/drawingml/2006/main" xmlns:r="http://schemas.openxmlformats.org/officeDocument/2006/relationships" xmlns:p="http://schemas.openxmlformats.org/presentationml/2006/main" type="title">
   <p:cSld name="Title Slide">
     <p:spTree>
       <p:nvGrpSpPr>
@@ -521,7 +531,9 @@
       <p:sp>
         <p:nvSpPr>
           <p:cNvPr id="11" name="Shape 11"/>
-          <p:cNvSpPr/>
+          <p:cNvSpPr>
+            <a:spLocks noGrp="1"/>
+          </p:cNvSpPr>
           <p:nvPr>
             <p:ph type="title"/>
           </p:nvPr>
@@ -543,7 +555,6 @@
             </a:lvl1pPr>
           </a:lstStyle>
           <a:p>
-            <a:pPr/>
             <a:r>
               <a:t>Title Text</a:t>
             </a:r>
@@ -553,7 +564,9 @@
       <p:sp>
         <p:nvSpPr>
           <p:cNvPr id="12" name="Shape 12"/>
-          <p:cNvSpPr/>
+          <p:cNvSpPr>
+            <a:spLocks noGrp="1"/>
+          </p:cNvSpPr>
           <p:nvPr>
             <p:ph type="body" sz="half" idx="1"/>
           </p:nvPr>
@@ -602,7 +615,6 @@
             </a:lvl5pPr>
           </a:lstStyle>
           <a:p>
-            <a:pPr/>
             <a:r>
               <a:t>Body Level One</a:t>
             </a:r>
@@ -636,7 +648,9 @@
       <p:sp>
         <p:nvSpPr>
           <p:cNvPr id="13" name="Shape 13"/>
-          <p:cNvSpPr/>
+          <p:cNvSpPr>
+            <a:spLocks noGrp="1"/>
+          </p:cNvSpPr>
           <p:nvPr>
             <p:ph type="sldNum" sz="quarter" idx="2"/>
           </p:nvPr>
@@ -650,8 +664,10 @@
           <a:bodyPr/>
           <a:lstStyle/>
           <a:p>
-            <a:pPr/>
-            <a:fld id="{86CB4B4D-7CA3-9044-876B-883B54F8677D}" type="slidenum"/>
+            <a:fld id="{86CB4B4D-7CA3-9044-876B-883B54F8677D}" type="slidenum">
+              <a:t>‹#›</a:t>
+            </a:fld>
+            <a:endParaRPr/>
           </a:p>
         </p:txBody>
       </p:sp>
@@ -660,12 +676,12 @@
   <p:clrMapOvr>
     <a:masterClrMapping/>
   </p:clrMapOvr>
-  <p:transition xmlns:p14="http://schemas.microsoft.com/office/powerpoint/2010/main" spd="med" advClick="1"/>
+  <p:transition spd="med"/>
 </p:sldLayout>
 </file>
 
 <file path=ppt/slideLayouts/slideLayout10.xml><?xml version="1.0" encoding="utf-8"?>
-<p:sldLayout xmlns:a="http://schemas.openxmlformats.org/drawingml/2006/main" xmlns:r="http://schemas.openxmlformats.org/officeDocument/2006/relationships" xmlns:p="http://schemas.openxmlformats.org/presentationml/2006/main" type="tx" showMasterSp="1" showMasterPhAnim="1">
+<p:sldLayout xmlns:a="http://schemas.openxmlformats.org/drawingml/2006/main" xmlns:r="http://schemas.openxmlformats.org/officeDocument/2006/relationships" xmlns:p="http://schemas.openxmlformats.org/presentationml/2006/main" type="tx">
   <p:cSld name="Title and Vertical Text">
     <p:spTree>
       <p:nvGrpSpPr>
@@ -684,7 +700,9 @@
       <p:sp>
         <p:nvSpPr>
           <p:cNvPr id="89" name="Shape 89"/>
-          <p:cNvSpPr/>
+          <p:cNvSpPr>
+            <a:spLocks noGrp="1"/>
+          </p:cNvSpPr>
           <p:nvPr>
             <p:ph type="title"/>
           </p:nvPr>
@@ -698,7 +716,6 @@
           <a:bodyPr/>
           <a:lstStyle/>
           <a:p>
-            <a:pPr/>
             <a:r>
               <a:t>Title Text</a:t>
             </a:r>
@@ -708,7 +725,9 @@
       <p:sp>
         <p:nvSpPr>
           <p:cNvPr id="90" name="Shape 90"/>
-          <p:cNvSpPr/>
+          <p:cNvSpPr>
+            <a:spLocks noGrp="1"/>
+          </p:cNvSpPr>
           <p:nvPr>
             <p:ph type="body" idx="1"/>
           </p:nvPr>
@@ -722,7 +741,6 @@
           <a:bodyPr/>
           <a:lstStyle/>
           <a:p>
-            <a:pPr/>
             <a:r>
               <a:t>Body Level One</a:t>
             </a:r>
@@ -756,7 +774,9 @@
       <p:sp>
         <p:nvSpPr>
           <p:cNvPr id="91" name="Shape 91"/>
-          <p:cNvSpPr/>
+          <p:cNvSpPr>
+            <a:spLocks noGrp="1"/>
+          </p:cNvSpPr>
           <p:nvPr>
             <p:ph type="sldNum" sz="quarter" idx="2"/>
           </p:nvPr>
@@ -770,8 +790,10 @@
           <a:bodyPr/>
           <a:lstStyle/>
           <a:p>
-            <a:pPr/>
-            <a:fld id="{86CB4B4D-7CA3-9044-876B-883B54F8677D}" type="slidenum"/>
+            <a:fld id="{86CB4B4D-7CA3-9044-876B-883B54F8677D}" type="slidenum">
+              <a:t>‹#›</a:t>
+            </a:fld>
+            <a:endParaRPr/>
           </a:p>
         </p:txBody>
       </p:sp>
@@ -780,12 +802,12 @@
   <p:clrMapOvr>
     <a:masterClrMapping/>
   </p:clrMapOvr>
-  <p:transition xmlns:p14="http://schemas.microsoft.com/office/powerpoint/2010/main" spd="med" advClick="1"/>
+  <p:transition spd="med"/>
 </p:sldLayout>
 </file>
 
 <file path=ppt/slideLayouts/slideLayout11.xml><?xml version="1.0" encoding="utf-8"?>
-<p:sldLayout xmlns:a="http://schemas.openxmlformats.org/drawingml/2006/main" xmlns:r="http://schemas.openxmlformats.org/officeDocument/2006/relationships" xmlns:p="http://schemas.openxmlformats.org/presentationml/2006/main" type="tx" showMasterSp="1" showMasterPhAnim="1">
+<p:sldLayout xmlns:a="http://schemas.openxmlformats.org/drawingml/2006/main" xmlns:r="http://schemas.openxmlformats.org/officeDocument/2006/relationships" xmlns:p="http://schemas.openxmlformats.org/presentationml/2006/main" type="tx">
   <p:cSld name="Vertical Title and Text">
     <p:spTree>
       <p:nvGrpSpPr>
@@ -804,7 +826,9 @@
       <p:sp>
         <p:nvSpPr>
           <p:cNvPr id="98" name="Shape 98"/>
-          <p:cNvSpPr/>
+          <p:cNvSpPr>
+            <a:spLocks noGrp="1"/>
+          </p:cNvSpPr>
           <p:nvPr>
             <p:ph type="title"/>
           </p:nvPr>
@@ -822,7 +846,6 @@
           <a:bodyPr/>
           <a:lstStyle/>
           <a:p>
-            <a:pPr/>
             <a:r>
               <a:t>Title Text</a:t>
             </a:r>
@@ -832,7 +855,9 @@
       <p:sp>
         <p:nvSpPr>
           <p:cNvPr id="99" name="Shape 99"/>
-          <p:cNvSpPr/>
+          <p:cNvSpPr>
+            <a:spLocks noGrp="1"/>
+          </p:cNvSpPr>
           <p:nvPr>
             <p:ph type="body" idx="1"/>
           </p:nvPr>
@@ -850,7 +875,6 @@
           <a:bodyPr/>
           <a:lstStyle/>
           <a:p>
-            <a:pPr/>
             <a:r>
               <a:t>Body Level One</a:t>
             </a:r>
@@ -884,7 +908,9 @@
       <p:sp>
         <p:nvSpPr>
           <p:cNvPr id="100" name="Shape 100"/>
-          <p:cNvSpPr/>
+          <p:cNvSpPr>
+            <a:spLocks noGrp="1"/>
+          </p:cNvSpPr>
           <p:nvPr>
             <p:ph type="sldNum" sz="quarter" idx="2"/>
           </p:nvPr>
@@ -898,8 +924,10 @@
           <a:bodyPr/>
           <a:lstStyle/>
           <a:p>
-            <a:pPr/>
-            <a:fld id="{86CB4B4D-7CA3-9044-876B-883B54F8677D}" type="slidenum"/>
+            <a:fld id="{86CB4B4D-7CA3-9044-876B-883B54F8677D}" type="slidenum">
+              <a:t>‹#›</a:t>
+            </a:fld>
+            <a:endParaRPr/>
           </a:p>
         </p:txBody>
       </p:sp>
@@ -908,12 +936,12 @@
   <p:clrMapOvr>
     <a:masterClrMapping/>
   </p:clrMapOvr>
-  <p:transition xmlns:p14="http://schemas.microsoft.com/office/powerpoint/2010/main" spd="med" advClick="1"/>
+  <p:transition spd="med"/>
 </p:sldLayout>
 </file>
 
 <file path=ppt/slideLayouts/slideLayout2.xml><?xml version="1.0" encoding="utf-8"?>
-<p:sldLayout xmlns:a="http://schemas.openxmlformats.org/drawingml/2006/main" xmlns:r="http://schemas.openxmlformats.org/officeDocument/2006/relationships" xmlns:p="http://schemas.openxmlformats.org/presentationml/2006/main" type="tx" showMasterSp="1" showMasterPhAnim="1">
+<p:sldLayout xmlns:a="http://schemas.openxmlformats.org/drawingml/2006/main" xmlns:r="http://schemas.openxmlformats.org/officeDocument/2006/relationships" xmlns:p="http://schemas.openxmlformats.org/presentationml/2006/main" type="tx">
   <p:cSld name="Title and Content">
     <p:spTree>
       <p:nvGrpSpPr>
@@ -932,7 +960,9 @@
       <p:sp>
         <p:nvSpPr>
           <p:cNvPr id="20" name="Shape 20"/>
-          <p:cNvSpPr/>
+          <p:cNvSpPr>
+            <a:spLocks noGrp="1"/>
+          </p:cNvSpPr>
           <p:nvPr>
             <p:ph type="title"/>
           </p:nvPr>
@@ -946,7 +976,6 @@
           <a:bodyPr/>
           <a:lstStyle/>
           <a:p>
-            <a:pPr/>
             <a:r>
               <a:t>Title Text</a:t>
             </a:r>
@@ -956,7 +985,9 @@
       <p:sp>
         <p:nvSpPr>
           <p:cNvPr id="21" name="Shape 21"/>
-          <p:cNvSpPr/>
+          <p:cNvSpPr>
+            <a:spLocks noGrp="1"/>
+          </p:cNvSpPr>
           <p:nvPr>
             <p:ph type="body" idx="1"/>
           </p:nvPr>
@@ -970,7 +1001,6 @@
           <a:bodyPr/>
           <a:lstStyle/>
           <a:p>
-            <a:pPr/>
             <a:r>
               <a:t>Body Level One</a:t>
             </a:r>
@@ -1004,7 +1034,9 @@
       <p:sp>
         <p:nvSpPr>
           <p:cNvPr id="22" name="Shape 22"/>
-          <p:cNvSpPr/>
+          <p:cNvSpPr>
+            <a:spLocks noGrp="1"/>
+          </p:cNvSpPr>
           <p:nvPr>
             <p:ph type="sldNum" sz="quarter" idx="2"/>
           </p:nvPr>
@@ -1018,8 +1050,10 @@
           <a:bodyPr/>
           <a:lstStyle/>
           <a:p>
-            <a:pPr/>
-            <a:fld id="{86CB4B4D-7CA3-9044-876B-883B54F8677D}" type="slidenum"/>
+            <a:fld id="{86CB4B4D-7CA3-9044-876B-883B54F8677D}" type="slidenum">
+              <a:t>‹#›</a:t>
+            </a:fld>
+            <a:endParaRPr/>
           </a:p>
         </p:txBody>
       </p:sp>
@@ -1028,12 +1062,12 @@
   <p:clrMapOvr>
     <a:masterClrMapping/>
   </p:clrMapOvr>
-  <p:transition xmlns:p14="http://schemas.microsoft.com/office/powerpoint/2010/main" spd="med" advClick="1"/>
+  <p:transition spd="med"/>
 </p:sldLayout>
 </file>
 
 <file path=ppt/slideLayouts/slideLayout3.xml><?xml version="1.0" encoding="utf-8"?>
-<p:sldLayout xmlns:a="http://schemas.openxmlformats.org/drawingml/2006/main" xmlns:r="http://schemas.openxmlformats.org/officeDocument/2006/relationships" xmlns:p="http://schemas.openxmlformats.org/presentationml/2006/main" type="tx" showMasterSp="1" showMasterPhAnim="1">
+<p:sldLayout xmlns:a="http://schemas.openxmlformats.org/drawingml/2006/main" xmlns:r="http://schemas.openxmlformats.org/officeDocument/2006/relationships" xmlns:p="http://schemas.openxmlformats.org/presentationml/2006/main" type="tx">
   <p:cSld name="Section Header">
     <p:spTree>
       <p:nvGrpSpPr>
@@ -1052,7 +1086,9 @@
       <p:sp>
         <p:nvSpPr>
           <p:cNvPr id="29" name="Shape 29"/>
-          <p:cNvSpPr/>
+          <p:cNvSpPr>
+            <a:spLocks noGrp="1"/>
+          </p:cNvSpPr>
           <p:nvPr>
             <p:ph type="title"/>
           </p:nvPr>
@@ -1074,7 +1110,6 @@
             </a:lvl1pPr>
           </a:lstStyle>
           <a:p>
-            <a:pPr/>
             <a:r>
               <a:t>Title Text</a:t>
             </a:r>
@@ -1084,7 +1119,9 @@
       <p:sp>
         <p:nvSpPr>
           <p:cNvPr id="30" name="Shape 30"/>
-          <p:cNvSpPr/>
+          <p:cNvSpPr>
+            <a:spLocks noGrp="1"/>
+          </p:cNvSpPr>
           <p:nvPr>
             <p:ph type="body" sz="half" idx="1"/>
           </p:nvPr>
@@ -1153,7 +1190,6 @@
             </a:lvl5pPr>
           </a:lstStyle>
           <a:p>
-            <a:pPr/>
             <a:r>
               <a:t>Body Level One</a:t>
             </a:r>
@@ -1187,7 +1223,9 @@
       <p:sp>
         <p:nvSpPr>
           <p:cNvPr id="31" name="Shape 31"/>
-          <p:cNvSpPr/>
+          <p:cNvSpPr>
+            <a:spLocks noGrp="1"/>
+          </p:cNvSpPr>
           <p:nvPr>
             <p:ph type="sldNum" sz="quarter" idx="2"/>
           </p:nvPr>
@@ -1201,8 +1239,10 @@
           <a:bodyPr/>
           <a:lstStyle/>
           <a:p>
-            <a:pPr/>
-            <a:fld id="{86CB4B4D-7CA3-9044-876B-883B54F8677D}" type="slidenum"/>
+            <a:fld id="{86CB4B4D-7CA3-9044-876B-883B54F8677D}" type="slidenum">
+              <a:t>‹#›</a:t>
+            </a:fld>
+            <a:endParaRPr/>
           </a:p>
         </p:txBody>
       </p:sp>
@@ -1211,12 +1251,12 @@
   <p:clrMapOvr>
     <a:masterClrMapping/>
   </p:clrMapOvr>
-  <p:transition xmlns:p14="http://schemas.microsoft.com/office/powerpoint/2010/main" spd="med" advClick="1"/>
+  <p:transition spd="med"/>
 </p:sldLayout>
 </file>
 
 <file path=ppt/slideLayouts/slideLayout4.xml><?xml version="1.0" encoding="utf-8"?>
-<p:sldLayout xmlns:a="http://schemas.openxmlformats.org/drawingml/2006/main" xmlns:r="http://schemas.openxmlformats.org/officeDocument/2006/relationships" xmlns:p="http://schemas.openxmlformats.org/presentationml/2006/main" type="tx" showMasterSp="1" showMasterPhAnim="1">
+<p:sldLayout xmlns:a="http://schemas.openxmlformats.org/drawingml/2006/main" xmlns:r="http://schemas.openxmlformats.org/officeDocument/2006/relationships" xmlns:p="http://schemas.openxmlformats.org/presentationml/2006/main" type="tx">
   <p:cSld name="Two Content">
     <p:spTree>
       <p:nvGrpSpPr>
@@ -1235,7 +1275,9 @@
       <p:sp>
         <p:nvSpPr>
           <p:cNvPr id="38" name="Shape 38"/>
-          <p:cNvSpPr/>
+          <p:cNvSpPr>
+            <a:spLocks noGrp="1"/>
+          </p:cNvSpPr>
           <p:nvPr>
             <p:ph type="title"/>
           </p:nvPr>
@@ -1249,7 +1291,6 @@
           <a:bodyPr/>
           <a:lstStyle/>
           <a:p>
-            <a:pPr/>
             <a:r>
               <a:t>Title Text</a:t>
             </a:r>
@@ -1259,7 +1300,9 @@
       <p:sp>
         <p:nvSpPr>
           <p:cNvPr id="39" name="Shape 39"/>
-          <p:cNvSpPr/>
+          <p:cNvSpPr>
+            <a:spLocks noGrp="1"/>
+          </p:cNvSpPr>
           <p:nvPr>
             <p:ph type="body" sz="half" idx="1"/>
           </p:nvPr>
@@ -1277,7 +1320,6 @@
           <a:bodyPr/>
           <a:lstStyle/>
           <a:p>
-            <a:pPr/>
             <a:r>
               <a:t>Body Level One</a:t>
             </a:r>
@@ -1311,7 +1353,9 @@
       <p:sp>
         <p:nvSpPr>
           <p:cNvPr id="40" name="Shape 40"/>
-          <p:cNvSpPr/>
+          <p:cNvSpPr>
+            <a:spLocks noGrp="1"/>
+          </p:cNvSpPr>
           <p:nvPr>
             <p:ph type="sldNum" sz="quarter" idx="2"/>
           </p:nvPr>
@@ -1325,8 +1369,10 @@
           <a:bodyPr/>
           <a:lstStyle/>
           <a:p>
-            <a:pPr/>
-            <a:fld id="{86CB4B4D-7CA3-9044-876B-883B54F8677D}" type="slidenum"/>
+            <a:fld id="{86CB4B4D-7CA3-9044-876B-883B54F8677D}" type="slidenum">
+              <a:t>‹#›</a:t>
+            </a:fld>
+            <a:endParaRPr/>
           </a:p>
         </p:txBody>
       </p:sp>
@@ -1335,12 +1381,12 @@
   <p:clrMapOvr>
     <a:masterClrMapping/>
   </p:clrMapOvr>
-  <p:transition xmlns:p14="http://schemas.microsoft.com/office/powerpoint/2010/main" spd="med" advClick="1"/>
+  <p:transition spd="med"/>
 </p:sldLayout>
 </file>
 
 <file path=ppt/slideLayouts/slideLayout5.xml><?xml version="1.0" encoding="utf-8"?>
-<p:sldLayout xmlns:a="http://schemas.openxmlformats.org/drawingml/2006/main" xmlns:r="http://schemas.openxmlformats.org/officeDocument/2006/relationships" xmlns:p="http://schemas.openxmlformats.org/presentationml/2006/main" type="tx" showMasterSp="1" showMasterPhAnim="1">
+<p:sldLayout xmlns:a="http://schemas.openxmlformats.org/drawingml/2006/main" xmlns:r="http://schemas.openxmlformats.org/officeDocument/2006/relationships" xmlns:p="http://schemas.openxmlformats.org/presentationml/2006/main" type="tx">
   <p:cSld name="Comparison">
     <p:spTree>
       <p:nvGrpSpPr>
@@ -1359,7 +1405,9 @@
       <p:sp>
         <p:nvSpPr>
           <p:cNvPr id="47" name="Shape 47"/>
-          <p:cNvSpPr/>
+          <p:cNvSpPr>
+            <a:spLocks noGrp="1"/>
+          </p:cNvSpPr>
           <p:nvPr>
             <p:ph type="title"/>
           </p:nvPr>
@@ -1377,7 +1425,6 @@
           <a:bodyPr/>
           <a:lstStyle/>
           <a:p>
-            <a:pPr/>
             <a:r>
               <a:t>Title Text</a:t>
             </a:r>
@@ -1387,7 +1434,9 @@
       <p:sp>
         <p:nvSpPr>
           <p:cNvPr id="48" name="Shape 48"/>
-          <p:cNvSpPr/>
+          <p:cNvSpPr>
+            <a:spLocks noGrp="1"/>
+          </p:cNvSpPr>
           <p:nvPr>
             <p:ph type="body" sz="quarter" idx="1"/>
           </p:nvPr>
@@ -1408,35 +1457,34 @@
               <a:buSzTx/>
               <a:buFontTx/>
               <a:buNone/>
-              <a:defRPr b="1" sz="2400"/>
+              <a:defRPr sz="2400" b="1"/>
             </a:lvl1pPr>
             <a:lvl2pPr marL="0" indent="457200">
               <a:buSzTx/>
               <a:buFontTx/>
               <a:buNone/>
-              <a:defRPr b="1" sz="2400"/>
+              <a:defRPr sz="2400" b="1"/>
             </a:lvl2pPr>
             <a:lvl3pPr marL="0" indent="914400">
               <a:buSzTx/>
               <a:buFontTx/>
               <a:buNone/>
-              <a:defRPr b="1" sz="2400"/>
+              <a:defRPr sz="2400" b="1"/>
             </a:lvl3pPr>
             <a:lvl4pPr marL="0" indent="1371600">
               <a:buSzTx/>
               <a:buFontTx/>
               <a:buNone/>
-              <a:defRPr b="1" sz="2400"/>
+              <a:defRPr sz="2400" b="1"/>
             </a:lvl4pPr>
             <a:lvl5pPr marL="0" indent="1828800">
               <a:buSzTx/>
               <a:buFontTx/>
               <a:buNone/>
-              <a:defRPr b="1" sz="2400"/>
+              <a:defRPr sz="2400" b="1"/>
             </a:lvl5pPr>
           </a:lstStyle>
           <a:p>
-            <a:pPr/>
             <a:r>
               <a:t>Body Level One</a:t>
             </a:r>
@@ -1470,7 +1518,9 @@
       <p:sp>
         <p:nvSpPr>
           <p:cNvPr id="49" name="Shape 49"/>
-          <p:cNvSpPr/>
+          <p:cNvSpPr>
+            <a:spLocks noGrp="1"/>
+          </p:cNvSpPr>
           <p:nvPr>
             <p:ph type="sldNum" sz="quarter" idx="2"/>
           </p:nvPr>
@@ -1484,8 +1534,10 @@
           <a:bodyPr/>
           <a:lstStyle/>
           <a:p>
-            <a:pPr/>
-            <a:fld id="{86CB4B4D-7CA3-9044-876B-883B54F8677D}" type="slidenum"/>
+            <a:fld id="{86CB4B4D-7CA3-9044-876B-883B54F8677D}" type="slidenum">
+              <a:t>‹#›</a:t>
+            </a:fld>
+            <a:endParaRPr/>
           </a:p>
         </p:txBody>
       </p:sp>
@@ -1494,12 +1546,12 @@
   <p:clrMapOvr>
     <a:masterClrMapping/>
   </p:clrMapOvr>
-  <p:transition xmlns:p14="http://schemas.microsoft.com/office/powerpoint/2010/main" spd="med" advClick="1"/>
+  <p:transition spd="med"/>
 </p:sldLayout>
 </file>
 
 <file path=ppt/slideLayouts/slideLayout6.xml><?xml version="1.0" encoding="utf-8"?>
-<p:sldLayout xmlns:a="http://schemas.openxmlformats.org/drawingml/2006/main" xmlns:r="http://schemas.openxmlformats.org/officeDocument/2006/relationships" xmlns:p="http://schemas.openxmlformats.org/presentationml/2006/main" type="tx" showMasterSp="1" showMasterPhAnim="1">
+<p:sldLayout xmlns:a="http://schemas.openxmlformats.org/drawingml/2006/main" xmlns:r="http://schemas.openxmlformats.org/officeDocument/2006/relationships" xmlns:p="http://schemas.openxmlformats.org/presentationml/2006/main" type="tx">
   <p:cSld name="Title Only">
     <p:spTree>
       <p:nvGrpSpPr>
@@ -1518,7 +1570,9 @@
       <p:sp>
         <p:nvSpPr>
           <p:cNvPr id="56" name="Shape 56"/>
-          <p:cNvSpPr/>
+          <p:cNvSpPr>
+            <a:spLocks noGrp="1"/>
+          </p:cNvSpPr>
           <p:nvPr>
             <p:ph type="title"/>
           </p:nvPr>
@@ -1536,7 +1590,6 @@
           <a:bodyPr/>
           <a:lstStyle/>
           <a:p>
-            <a:pPr/>
             <a:r>
               <a:t>Title Text</a:t>
             </a:r>
@@ -1546,7 +1599,9 @@
       <p:sp>
         <p:nvSpPr>
           <p:cNvPr id="57" name="Shape 57"/>
-          <p:cNvSpPr/>
+          <p:cNvSpPr>
+            <a:spLocks noGrp="1"/>
+          </p:cNvSpPr>
           <p:nvPr>
             <p:ph type="sldNum" sz="quarter" idx="2"/>
           </p:nvPr>
@@ -1560,8 +1615,10 @@
           <a:bodyPr/>
           <a:lstStyle/>
           <a:p>
-            <a:pPr/>
-            <a:fld id="{86CB4B4D-7CA3-9044-876B-883B54F8677D}" type="slidenum"/>
+            <a:fld id="{86CB4B4D-7CA3-9044-876B-883B54F8677D}" type="slidenum">
+              <a:t>‹#›</a:t>
+            </a:fld>
+            <a:endParaRPr/>
           </a:p>
         </p:txBody>
       </p:sp>
@@ -1570,12 +1627,12 @@
   <p:clrMapOvr>
     <a:masterClrMapping/>
   </p:clrMapOvr>
-  <p:transition xmlns:p14="http://schemas.microsoft.com/office/powerpoint/2010/main" spd="med" advClick="1"/>
+  <p:transition spd="med"/>
 </p:sldLayout>
 </file>
 
 <file path=ppt/slideLayouts/slideLayout7.xml><?xml version="1.0" encoding="utf-8"?>
-<p:sldLayout xmlns:a="http://schemas.openxmlformats.org/drawingml/2006/main" xmlns:r="http://schemas.openxmlformats.org/officeDocument/2006/relationships" xmlns:p="http://schemas.openxmlformats.org/presentationml/2006/main" type="tx" showMasterSp="1" showMasterPhAnim="1">
+<p:sldLayout xmlns:a="http://schemas.openxmlformats.org/drawingml/2006/main" xmlns:r="http://schemas.openxmlformats.org/officeDocument/2006/relationships" xmlns:p="http://schemas.openxmlformats.org/presentationml/2006/main" type="tx">
   <p:cSld name="Blank">
     <p:spTree>
       <p:nvGrpSpPr>
@@ -1594,7 +1651,9 @@
       <p:sp>
         <p:nvSpPr>
           <p:cNvPr id="64" name="Shape 64"/>
-          <p:cNvSpPr/>
+          <p:cNvSpPr>
+            <a:spLocks noGrp="1"/>
+          </p:cNvSpPr>
           <p:nvPr>
             <p:ph type="sldNum" sz="quarter" idx="2"/>
           </p:nvPr>
@@ -1608,8 +1667,10 @@
           <a:bodyPr/>
           <a:lstStyle/>
           <a:p>
-            <a:pPr/>
-            <a:fld id="{86CB4B4D-7CA3-9044-876B-883B54F8677D}" type="slidenum"/>
+            <a:fld id="{86CB4B4D-7CA3-9044-876B-883B54F8677D}" type="slidenum">
+              <a:t>‹#›</a:t>
+            </a:fld>
+            <a:endParaRPr/>
           </a:p>
         </p:txBody>
       </p:sp>
@@ -1618,12 +1679,12 @@
   <p:clrMapOvr>
     <a:masterClrMapping/>
   </p:clrMapOvr>
-  <p:transition xmlns:p14="http://schemas.microsoft.com/office/powerpoint/2010/main" spd="med" advClick="1"/>
+  <p:transition spd="med"/>
 </p:sldLayout>
 </file>
 
 <file path=ppt/slideLayouts/slideLayout8.xml><?xml version="1.0" encoding="utf-8"?>
-<p:sldLayout xmlns:a="http://schemas.openxmlformats.org/drawingml/2006/main" xmlns:r="http://schemas.openxmlformats.org/officeDocument/2006/relationships" xmlns:p="http://schemas.openxmlformats.org/presentationml/2006/main" type="tx" showMasterSp="1" showMasterPhAnim="1">
+<p:sldLayout xmlns:a="http://schemas.openxmlformats.org/drawingml/2006/main" xmlns:r="http://schemas.openxmlformats.org/officeDocument/2006/relationships" xmlns:p="http://schemas.openxmlformats.org/presentationml/2006/main" type="tx">
   <p:cSld name="Content with Caption">
     <p:spTree>
       <p:nvGrpSpPr>
@@ -1642,7 +1703,9 @@
       <p:sp>
         <p:nvSpPr>
           <p:cNvPr id="71" name="Shape 71"/>
-          <p:cNvSpPr/>
+          <p:cNvSpPr>
+            <a:spLocks noGrp="1"/>
+          </p:cNvSpPr>
           <p:nvPr>
             <p:ph type="title"/>
           </p:nvPr>
@@ -1664,7 +1727,6 @@
             </a:lvl1pPr>
           </a:lstStyle>
           <a:p>
-            <a:pPr/>
             <a:r>
               <a:t>Title Text</a:t>
             </a:r>
@@ -1674,7 +1736,9 @@
       <p:sp>
         <p:nvSpPr>
           <p:cNvPr id="72" name="Shape 72"/>
-          <p:cNvSpPr/>
+          <p:cNvSpPr>
+            <a:spLocks noGrp="1"/>
+          </p:cNvSpPr>
           <p:nvPr>
             <p:ph type="body" idx="1"/>
           </p:nvPr>
@@ -1708,7 +1772,6 @@
             </a:lvl5pPr>
           </a:lstStyle>
           <a:p>
-            <a:pPr/>
             <a:r>
               <a:t>Body Level One</a:t>
             </a:r>
@@ -1742,7 +1805,9 @@
       <p:sp>
         <p:nvSpPr>
           <p:cNvPr id="73" name="Shape 73"/>
-          <p:cNvSpPr/>
+          <p:cNvSpPr>
+            <a:spLocks noGrp="1"/>
+          </p:cNvSpPr>
           <p:nvPr>
             <p:ph type="sldNum" sz="quarter" idx="2"/>
           </p:nvPr>
@@ -1756,8 +1821,10 @@
           <a:bodyPr/>
           <a:lstStyle/>
           <a:p>
-            <a:pPr/>
-            <a:fld id="{86CB4B4D-7CA3-9044-876B-883B54F8677D}" type="slidenum"/>
+            <a:fld id="{86CB4B4D-7CA3-9044-876B-883B54F8677D}" type="slidenum">
+              <a:t>‹#›</a:t>
+            </a:fld>
+            <a:endParaRPr/>
           </a:p>
         </p:txBody>
       </p:sp>
@@ -1766,12 +1833,12 @@
   <p:clrMapOvr>
     <a:masterClrMapping/>
   </p:clrMapOvr>
-  <p:transition xmlns:p14="http://schemas.microsoft.com/office/powerpoint/2010/main" spd="med" advClick="1"/>
+  <p:transition spd="med"/>
 </p:sldLayout>
 </file>
 
 <file path=ppt/slideLayouts/slideLayout9.xml><?xml version="1.0" encoding="utf-8"?>
-<p:sldLayout xmlns:a="http://schemas.openxmlformats.org/drawingml/2006/main" xmlns:r="http://schemas.openxmlformats.org/officeDocument/2006/relationships" xmlns:p="http://schemas.openxmlformats.org/presentationml/2006/main" type="tx" showMasterSp="1" showMasterPhAnim="1">
+<p:sldLayout xmlns:a="http://schemas.openxmlformats.org/drawingml/2006/main" xmlns:r="http://schemas.openxmlformats.org/officeDocument/2006/relationships" xmlns:p="http://schemas.openxmlformats.org/presentationml/2006/main" type="tx">
   <p:cSld name="Picture with Caption">
     <p:spTree>
       <p:nvGrpSpPr>
@@ -1790,7 +1857,9 @@
       <p:sp>
         <p:nvSpPr>
           <p:cNvPr id="80" name="Shape 80"/>
-          <p:cNvSpPr/>
+          <p:cNvSpPr>
+            <a:spLocks noGrp="1"/>
+          </p:cNvSpPr>
           <p:nvPr>
             <p:ph type="title"/>
           </p:nvPr>
@@ -1812,7 +1881,6 @@
             </a:lvl1pPr>
           </a:lstStyle>
           <a:p>
-            <a:pPr/>
             <a:r>
               <a:t>Title Text</a:t>
             </a:r>
@@ -1822,7 +1890,9 @@
       <p:sp>
         <p:nvSpPr>
           <p:cNvPr id="81" name="Shape 81"/>
-          <p:cNvSpPr/>
+          <p:cNvSpPr>
+            <a:spLocks noGrp="1"/>
+          </p:cNvSpPr>
           <p:nvPr>
             <p:ph type="body" sz="half" idx="1"/>
           </p:nvPr>
@@ -1871,7 +1941,6 @@
             </a:lvl5pPr>
           </a:lstStyle>
           <a:p>
-            <a:pPr/>
             <a:r>
               <a:t>Body Level One</a:t>
             </a:r>
@@ -1905,7 +1974,9 @@
       <p:sp>
         <p:nvSpPr>
           <p:cNvPr id="82" name="Shape 82"/>
-          <p:cNvSpPr/>
+          <p:cNvSpPr>
+            <a:spLocks noGrp="1"/>
+          </p:cNvSpPr>
           <p:nvPr>
             <p:ph type="sldNum" sz="quarter" idx="2"/>
           </p:nvPr>
@@ -1919,8 +1990,10 @@
           <a:bodyPr/>
           <a:lstStyle/>
           <a:p>
-            <a:pPr/>
-            <a:fld id="{86CB4B4D-7CA3-9044-876B-883B54F8677D}" type="slidenum"/>
+            <a:fld id="{86CB4B4D-7CA3-9044-876B-883B54F8677D}" type="slidenum">
+              <a:t>‹#›</a:t>
+            </a:fld>
+            <a:endParaRPr/>
           </a:p>
         </p:txBody>
       </p:sp>
@@ -1929,7 +2002,7 @@
   <p:clrMapOvr>
     <a:masterClrMapping/>
   </p:clrMapOvr>
-  <p:transition xmlns:p14="http://schemas.microsoft.com/office/powerpoint/2010/main" spd="med" advClick="1"/>
+  <p:transition spd="med"/>
 </p:sldLayout>
 </file>
 
@@ -1941,6 +2014,7 @@
         <a:solidFill>
           <a:srgbClr val="FFFFFF"/>
         </a:solidFill>
+        <a:effectLst/>
       </p:bgPr>
     </p:bg>
     <p:spTree>
@@ -1960,7 +2034,9 @@
       <p:sp>
         <p:nvSpPr>
           <p:cNvPr id="2" name="Shape 2"/>
-          <p:cNvSpPr/>
+          <p:cNvSpPr>
+            <a:spLocks noGrp="1"/>
+          </p:cNvSpPr>
           <p:nvPr>
             <p:ph type="title"/>
           </p:nvPr>
@@ -1984,11 +2060,10 @@
         </p:spPr>
         <p:txBody>
           <a:bodyPr lIns="45719" rIns="45719" anchor="ctr">
-            <a:normAutofit fontScale="100000" lnSpcReduction="0"/>
+            <a:normAutofit/>
           </a:bodyPr>
           <a:lstStyle/>
           <a:p>
-            <a:pPr/>
             <a:r>
               <a:t>Title Text</a:t>
             </a:r>
@@ -1998,7 +2073,9 @@
       <p:sp>
         <p:nvSpPr>
           <p:cNvPr id="3" name="Shape 3"/>
-          <p:cNvSpPr/>
+          <p:cNvSpPr>
+            <a:spLocks noGrp="1"/>
+          </p:cNvSpPr>
           <p:nvPr>
             <p:ph type="body" idx="1"/>
           </p:nvPr>
@@ -2022,11 +2099,10 @@
         </p:spPr>
         <p:txBody>
           <a:bodyPr lIns="45719" rIns="45719">
-            <a:normAutofit fontScale="100000" lnSpcReduction="0"/>
+            <a:normAutofit/>
           </a:bodyPr>
           <a:lstStyle/>
           <a:p>
-            <a:pPr/>
             <a:r>
               <a:t>Body Level One</a:t>
             </a:r>
@@ -2060,7 +2136,9 @@
       <p:sp>
         <p:nvSpPr>
           <p:cNvPr id="4" name="Shape 4"/>
-          <p:cNvSpPr/>
+          <p:cNvSpPr>
+            <a:spLocks noGrp="1"/>
+          </p:cNvSpPr>
           <p:nvPr>
             <p:ph type="sldNum" sz="quarter" idx="2"/>
           </p:nvPr>
@@ -2091,8 +2169,10 @@
             </a:lvl1pPr>
           </a:lstStyle>
           <a:p>
-            <a:pPr/>
-            <a:fld id="{86CB4B4D-7CA3-9044-876B-883B54F8677D}" type="slidenum"/>
+            <a:fld id="{86CB4B4D-7CA3-9044-876B-883B54F8677D}" type="slidenum">
+              <a:t>‹#›</a:t>
+            </a:fld>
+            <a:endParaRPr/>
           </a:p>
         </p:txBody>
       </p:sp>
@@ -2100,19 +2180,19 @@
   </p:cSld>
   <p:clrMap bg1="lt1" tx1="dk1" bg2="lt2" tx2="dk2" accent1="accent1" accent2="accent2" accent3="accent3" accent4="accent4" accent5="accent5" accent6="accent6" hlink="hlink" folHlink="folHlink"/>
   <p:sldLayoutIdLst>
-    <p:sldLayoutId id="2147483649" r:id="rId2"/>
-    <p:sldLayoutId id="2147483650" r:id="rId3"/>
-    <p:sldLayoutId id="2147483651" r:id="rId4"/>
-    <p:sldLayoutId id="2147483652" r:id="rId5"/>
-    <p:sldLayoutId id="2147483653" r:id="rId6"/>
-    <p:sldLayoutId id="2147483654" r:id="rId7"/>
-    <p:sldLayoutId id="2147483655" r:id="rId8"/>
-    <p:sldLayoutId id="2147483656" r:id="rId9"/>
-    <p:sldLayoutId id="2147483657" r:id="rId10"/>
-    <p:sldLayoutId id="2147483658" r:id="rId11"/>
-    <p:sldLayoutId id="2147483659" r:id="rId12"/>
+    <p:sldLayoutId id="2147483649" r:id="rId1"/>
+    <p:sldLayoutId id="2147483650" r:id="rId2"/>
+    <p:sldLayoutId id="2147483651" r:id="rId3"/>
+    <p:sldLayoutId id="2147483652" r:id="rId4"/>
+    <p:sldLayoutId id="2147483653" r:id="rId5"/>
+    <p:sldLayoutId id="2147483654" r:id="rId6"/>
+    <p:sldLayoutId id="2147483655" r:id="rId7"/>
+    <p:sldLayoutId id="2147483656" r:id="rId8"/>
+    <p:sldLayoutId id="2147483657" r:id="rId9"/>
+    <p:sldLayoutId id="2147483658" r:id="rId10"/>
+    <p:sldLayoutId id="2147483659" r:id="rId11"/>
   </p:sldLayoutIdLst>
-  <p:transition xmlns:p14="http://schemas.microsoft.com/office/powerpoint/2010/main" spd="med" advClick="1"/>
+  <p:transition spd="med"/>
   <p:txStyles>
     <p:titleStyle>
       <a:lvl1pPr marL="0" marR="0" indent="0" algn="l" defTabSz="914400" rtl="0" latinLnBrk="0">
@@ -2130,7 +2210,7 @@
         <a:buFontTx/>
         <a:buNone/>
         <a:tabLst/>
-        <a:defRPr b="0" baseline="0" cap="none" i="0" spc="0" strike="noStrike" sz="4400" u="none">
+        <a:defRPr sz="4400" b="0" i="0" u="none" strike="noStrike" cap="none" spc="0" baseline="0">
           <a:ln>
             <a:noFill/>
           </a:ln>
@@ -2159,7 +2239,7 @@
         <a:buFontTx/>
         <a:buNone/>
         <a:tabLst/>
-        <a:defRPr b="0" baseline="0" cap="none" i="0" spc="0" strike="noStrike" sz="4400" u="none">
+        <a:defRPr sz="4400" b="0" i="0" u="none" strike="noStrike" cap="none" spc="0" baseline="0">
           <a:ln>
             <a:noFill/>
           </a:ln>
@@ -2188,7 +2268,7 @@
         <a:buFontTx/>
         <a:buNone/>
         <a:tabLst/>
-        <a:defRPr b="0" baseline="0" cap="none" i="0" spc="0" strike="noStrike" sz="4400" u="none">
+        <a:defRPr sz="4400" b="0" i="0" u="none" strike="noStrike" cap="none" spc="0" baseline="0">
           <a:ln>
             <a:noFill/>
           </a:ln>
@@ -2217,7 +2297,7 @@
         <a:buFontTx/>
         <a:buNone/>
         <a:tabLst/>
-        <a:defRPr b="0" baseline="0" cap="none" i="0" spc="0" strike="noStrike" sz="4400" u="none">
+        <a:defRPr sz="4400" b="0" i="0" u="none" strike="noStrike" cap="none" spc="0" baseline="0">
           <a:ln>
             <a:noFill/>
           </a:ln>
@@ -2246,7 +2326,7 @@
         <a:buFontTx/>
         <a:buNone/>
         <a:tabLst/>
-        <a:defRPr b="0" baseline="0" cap="none" i="0" spc="0" strike="noStrike" sz="4400" u="none">
+        <a:defRPr sz="4400" b="0" i="0" u="none" strike="noStrike" cap="none" spc="0" baseline="0">
           <a:ln>
             <a:noFill/>
           </a:ln>
@@ -2275,7 +2355,7 @@
         <a:buFontTx/>
         <a:buNone/>
         <a:tabLst/>
-        <a:defRPr b="0" baseline="0" cap="none" i="0" spc="0" strike="noStrike" sz="4400" u="none">
+        <a:defRPr sz="4400" b="0" i="0" u="none" strike="noStrike" cap="none" spc="0" baseline="0">
           <a:ln>
             <a:noFill/>
           </a:ln>
@@ -2304,7 +2384,7 @@
         <a:buFontTx/>
         <a:buNone/>
         <a:tabLst/>
-        <a:defRPr b="0" baseline="0" cap="none" i="0" spc="0" strike="noStrike" sz="4400" u="none">
+        <a:defRPr sz="4400" b="0" i="0" u="none" strike="noStrike" cap="none" spc="0" baseline="0">
           <a:ln>
             <a:noFill/>
           </a:ln>
@@ -2333,7 +2413,7 @@
         <a:buFontTx/>
         <a:buNone/>
         <a:tabLst/>
-        <a:defRPr b="0" baseline="0" cap="none" i="0" spc="0" strike="noStrike" sz="4400" u="none">
+        <a:defRPr sz="4400" b="0" i="0" u="none" strike="noStrike" cap="none" spc="0" baseline="0">
           <a:ln>
             <a:noFill/>
           </a:ln>
@@ -2362,7 +2442,7 @@
         <a:buFontTx/>
         <a:buNone/>
         <a:tabLst/>
-        <a:defRPr b="0" baseline="0" cap="none" i="0" spc="0" strike="noStrike" sz="4400" u="none">
+        <a:defRPr sz="4400" b="0" i="0" u="none" strike="noStrike" cap="none" spc="0" baseline="0">
           <a:ln>
             <a:noFill/>
           </a:ln>
@@ -2393,7 +2473,7 @@
         <a:buFont typeface="Arial"/>
         <a:buChar char="•"/>
         <a:tabLst/>
-        <a:defRPr b="0" baseline="0" cap="none" i="0" spc="0" strike="noStrike" sz="2800" u="none">
+        <a:defRPr sz="2800" b="0" i="0" u="none" strike="noStrike" cap="none" spc="0" baseline="0">
           <a:ln>
             <a:noFill/>
           </a:ln>
@@ -2422,7 +2502,7 @@
         <a:buFont typeface="Arial"/>
         <a:buChar char="•"/>
         <a:tabLst/>
-        <a:defRPr b="0" baseline="0" cap="none" i="0" spc="0" strike="noStrike" sz="2800" u="none">
+        <a:defRPr sz="2800" b="0" i="0" u="none" strike="noStrike" cap="none" spc="0" baseline="0">
           <a:ln>
             <a:noFill/>
           </a:ln>
@@ -2451,7 +2531,7 @@
         <a:buFont typeface="Arial"/>
         <a:buChar char="•"/>
         <a:tabLst/>
-        <a:defRPr b="0" baseline="0" cap="none" i="0" spc="0" strike="noStrike" sz="2800" u="none">
+        <a:defRPr sz="2800" b="0" i="0" u="none" strike="noStrike" cap="none" spc="0" baseline="0">
           <a:ln>
             <a:noFill/>
           </a:ln>
@@ -2480,7 +2560,7 @@
         <a:buFont typeface="Arial"/>
         <a:buChar char="•"/>
         <a:tabLst/>
-        <a:defRPr b="0" baseline="0" cap="none" i="0" spc="0" strike="noStrike" sz="2800" u="none">
+        <a:defRPr sz="2800" b="0" i="0" u="none" strike="noStrike" cap="none" spc="0" baseline="0">
           <a:ln>
             <a:noFill/>
           </a:ln>
@@ -2509,7 +2589,7 @@
         <a:buFont typeface="Arial"/>
         <a:buChar char="•"/>
         <a:tabLst/>
-        <a:defRPr b="0" baseline="0" cap="none" i="0" spc="0" strike="noStrike" sz="2800" u="none">
+        <a:defRPr sz="2800" b="0" i="0" u="none" strike="noStrike" cap="none" spc="0" baseline="0">
           <a:ln>
             <a:noFill/>
           </a:ln>
@@ -2538,7 +2618,7 @@
         <a:buFont typeface="Arial"/>
         <a:buChar char="•"/>
         <a:tabLst/>
-        <a:defRPr b="0" baseline="0" cap="none" i="0" spc="0" strike="noStrike" sz="2800" u="none">
+        <a:defRPr sz="2800" b="0" i="0" u="none" strike="noStrike" cap="none" spc="0" baseline="0">
           <a:ln>
             <a:noFill/>
           </a:ln>
@@ -2567,7 +2647,7 @@
         <a:buFont typeface="Arial"/>
         <a:buChar char="•"/>
         <a:tabLst/>
-        <a:defRPr b="0" baseline="0" cap="none" i="0" spc="0" strike="noStrike" sz="2800" u="none">
+        <a:defRPr sz="2800" b="0" i="0" u="none" strike="noStrike" cap="none" spc="0" baseline="0">
           <a:ln>
             <a:noFill/>
           </a:ln>
@@ -2596,7 +2676,7 @@
         <a:buFont typeface="Arial"/>
         <a:buChar char="•"/>
         <a:tabLst/>
-        <a:defRPr b="0" baseline="0" cap="none" i="0" spc="0" strike="noStrike" sz="2800" u="none">
+        <a:defRPr sz="2800" b="0" i="0" u="none" strike="noStrike" cap="none" spc="0" baseline="0">
           <a:ln>
             <a:noFill/>
           </a:ln>
@@ -2625,7 +2705,7 @@
         <a:buFont typeface="Arial"/>
         <a:buChar char="•"/>
         <a:tabLst/>
-        <a:defRPr b="0" baseline="0" cap="none" i="0" spc="0" strike="noStrike" sz="2800" u="none">
+        <a:defRPr sz="2800" b="0" i="0" u="none" strike="noStrike" cap="none" spc="0" baseline="0">
           <a:ln>
             <a:noFill/>
           </a:ln>
@@ -2656,7 +2736,7 @@
         <a:buFontTx/>
         <a:buNone/>
         <a:tabLst/>
-        <a:defRPr b="0" baseline="0" cap="none" i="0" spc="0" strike="noStrike" sz="1200" u="none">
+        <a:defRPr sz="1200" b="0" i="0" u="none" strike="noStrike" cap="none" spc="0" baseline="0">
           <a:ln>
             <a:noFill/>
           </a:ln>
@@ -2685,7 +2765,7 @@
         <a:buFontTx/>
         <a:buNone/>
         <a:tabLst/>
-        <a:defRPr b="0" baseline="0" cap="none" i="0" spc="0" strike="noStrike" sz="1200" u="none">
+        <a:defRPr sz="1200" b="0" i="0" u="none" strike="noStrike" cap="none" spc="0" baseline="0">
           <a:ln>
             <a:noFill/>
           </a:ln>
@@ -2714,7 +2794,7 @@
         <a:buFontTx/>
         <a:buNone/>
         <a:tabLst/>
-        <a:defRPr b="0" baseline="0" cap="none" i="0" spc="0" strike="noStrike" sz="1200" u="none">
+        <a:defRPr sz="1200" b="0" i="0" u="none" strike="noStrike" cap="none" spc="0" baseline="0">
           <a:ln>
             <a:noFill/>
           </a:ln>
@@ -2743,7 +2823,7 @@
         <a:buFontTx/>
         <a:buNone/>
         <a:tabLst/>
-        <a:defRPr b="0" baseline="0" cap="none" i="0" spc="0" strike="noStrike" sz="1200" u="none">
+        <a:defRPr sz="1200" b="0" i="0" u="none" strike="noStrike" cap="none" spc="0" baseline="0">
           <a:ln>
             <a:noFill/>
           </a:ln>
@@ -2772,7 +2852,7 @@
         <a:buFontTx/>
         <a:buNone/>
         <a:tabLst/>
-        <a:defRPr b="0" baseline="0" cap="none" i="0" spc="0" strike="noStrike" sz="1200" u="none">
+        <a:defRPr sz="1200" b="0" i="0" u="none" strike="noStrike" cap="none" spc="0" baseline="0">
           <a:ln>
             <a:noFill/>
           </a:ln>
@@ -2801,7 +2881,7 @@
         <a:buFontTx/>
         <a:buNone/>
         <a:tabLst/>
-        <a:defRPr b="0" baseline="0" cap="none" i="0" spc="0" strike="noStrike" sz="1200" u="none">
+        <a:defRPr sz="1200" b="0" i="0" u="none" strike="noStrike" cap="none" spc="0" baseline="0">
           <a:ln>
             <a:noFill/>
           </a:ln>
@@ -2830,7 +2910,7 @@
         <a:buFontTx/>
         <a:buNone/>
         <a:tabLst/>
-        <a:defRPr b="0" baseline="0" cap="none" i="0" spc="0" strike="noStrike" sz="1200" u="none">
+        <a:defRPr sz="1200" b="0" i="0" u="none" strike="noStrike" cap="none" spc="0" baseline="0">
           <a:ln>
             <a:noFill/>
           </a:ln>
@@ -2859,7 +2939,7 @@
         <a:buFontTx/>
         <a:buNone/>
         <a:tabLst/>
-        <a:defRPr b="0" baseline="0" cap="none" i="0" spc="0" strike="noStrike" sz="1200" u="none">
+        <a:defRPr sz="1200" b="0" i="0" u="none" strike="noStrike" cap="none" spc="0" baseline="0">
           <a:ln>
             <a:noFill/>
           </a:ln>
@@ -2888,7 +2968,7 @@
         <a:buFontTx/>
         <a:buNone/>
         <a:tabLst/>
-        <a:defRPr b="0" baseline="0" cap="none" i="0" spc="0" strike="noStrike" sz="1200" u="none">
+        <a:defRPr sz="1200" b="0" i="0" u="none" strike="noStrike" cap="none" spc="0" baseline="0">
           <a:ln>
             <a:noFill/>
           </a:ln>
@@ -2908,7 +2988,7 @@
 </file>
 
 <file path=ppt/slides/slide1.xml><?xml version="1.0" encoding="utf-8"?>
-<p:sld xmlns:a="http://schemas.openxmlformats.org/drawingml/2006/main" xmlns:r="http://schemas.openxmlformats.org/officeDocument/2006/relationships" xmlns:p="http://schemas.openxmlformats.org/presentationml/2006/main" showMasterSp="1" showMasterPhAnim="1">
+<p:sld xmlns:a="http://schemas.openxmlformats.org/drawingml/2006/main" xmlns:r="http://schemas.openxmlformats.org/officeDocument/2006/relationships" xmlns:p="http://schemas.openxmlformats.org/presentationml/2006/main">
   <p:cSld>
     <p:spTree>
       <p:nvGrpSpPr>
@@ -2927,7 +3007,9 @@
       <p:sp>
         <p:nvSpPr>
           <p:cNvPr id="109" name="Shape 109"/>
-          <p:cNvSpPr/>
+          <p:cNvSpPr>
+            <a:spLocks noGrp="1"/>
+          </p:cNvSpPr>
           <p:nvPr>
             <p:ph type="subTitle" sz="half" idx="1"/>
           </p:nvPr>
@@ -2954,13 +3036,7 @@
               </a:defRPr>
             </a:pPr>
             <a:r>
-              <a:t>Group</a:t>
-            </a:r>
-            <a:r>
-              <a:t> </a:t>
-            </a:r>
-            <a:r>
-              <a:t>Member:</a:t>
+              <a:t>Group Member:</a:t>
             </a:r>
           </a:p>
           <a:p>
@@ -2972,6 +3048,7 @@
                 <a:sym typeface="Arial"/>
               </a:defRPr>
             </a:pPr>
+            <a:endParaRPr/>
           </a:p>
           <a:p>
             <a:pPr>
@@ -3052,7 +3129,6 @@
             </a:lvl1pPr>
           </a:lstStyle>
           <a:p>
-            <a:pPr/>
             <a:r>
               <a:t>Java Final Project — XDF 2DGraphics</a:t>
             </a:r>
@@ -3093,12 +3169,12 @@
   <p:clrMapOvr>
     <a:masterClrMapping/>
   </p:clrMapOvr>
-  <p:transition xmlns:p14="http://schemas.microsoft.com/office/powerpoint/2010/main" spd="med" advClick="1"/>
+  <p:transition spd="med"/>
 </p:sld>
 </file>
 
 <file path=ppt/slides/slide10.xml><?xml version="1.0" encoding="utf-8"?>
-<p:sld xmlns:a="http://schemas.openxmlformats.org/drawingml/2006/main" xmlns:r="http://schemas.openxmlformats.org/officeDocument/2006/relationships" xmlns:p="http://schemas.openxmlformats.org/presentationml/2006/main" showMasterSp="1" showMasterPhAnim="1">
+<p:sld xmlns:a="http://schemas.openxmlformats.org/drawingml/2006/main" xmlns:r="http://schemas.openxmlformats.org/officeDocument/2006/relationships" xmlns:p="http://schemas.openxmlformats.org/presentationml/2006/main">
   <p:cSld>
     <p:spTree>
       <p:nvGrpSpPr>
@@ -3122,8 +3198,8 @@
         </p:nvSpPr>
         <p:spPr>
           <a:xfrm>
-            <a:off x="2762451" y="5851646"/>
-            <a:ext cx="6822274" cy="742701"/>
+            <a:off x="2019080" y="5273906"/>
+            <a:ext cx="8116322" cy="430887"/>
           </a:xfrm>
           <a:prstGeom prst="rect">
             <a:avLst/>
@@ -3163,15 +3239,73 @@
               </a:defRPr>
             </a:pPr>
             <a:r>
+              <a:rPr dirty="0">
+                <a:latin typeface="Arial"/>
+                <a:ea typeface="Arial"/>
+                <a:cs typeface="Arial"/>
+                <a:sym typeface="Arial"/>
+              </a:rPr>
+              <a:t>Function 4, implement SVG file </a:t>
+            </a:r>
+            <a:r>
               <a:rPr>
                 <a:latin typeface="Arial"/>
                 <a:ea typeface="Arial"/>
                 <a:cs typeface="Arial"/>
                 <a:sym typeface="Arial"/>
               </a:rPr>
-              <a:t>Function 4, implement SVG file zoom in or zoom out</a:t>
-            </a:r>
-            <a:endParaRPr>
+              <a:t>zoom </a:t>
+            </a:r>
+            <a:r>
+              <a:rPr smtClean="0">
+                <a:latin typeface="Arial"/>
+                <a:ea typeface="Arial"/>
+                <a:cs typeface="Arial"/>
+                <a:sym typeface="Arial"/>
+              </a:rPr>
+              <a:t>in</a:t>
+            </a:r>
+            <a:r>
+              <a:rPr lang="en-US" dirty="0"/>
+              <a:t>,</a:t>
+            </a:r>
+            <a:r>
+              <a:rPr smtClean="0">
+                <a:latin typeface="Arial"/>
+                <a:ea typeface="Arial"/>
+                <a:cs typeface="Arial"/>
+                <a:sym typeface="Arial"/>
+              </a:rPr>
+              <a:t> </a:t>
+            </a:r>
+            <a:r>
+              <a:rPr>
+                <a:latin typeface="Arial"/>
+                <a:ea typeface="Arial"/>
+                <a:cs typeface="Arial"/>
+                <a:sym typeface="Arial"/>
+              </a:rPr>
+              <a:t>zoom </a:t>
+            </a:r>
+            <a:r>
+              <a:rPr smtClean="0">
+                <a:latin typeface="Arial"/>
+                <a:ea typeface="Arial"/>
+                <a:cs typeface="Arial"/>
+                <a:sym typeface="Arial"/>
+              </a:rPr>
+              <a:t>out</a:t>
+            </a:r>
+            <a:r>
+              <a:rPr lang="en-US" smtClean="0">
+                <a:latin typeface="Arial"/>
+                <a:ea typeface="Arial"/>
+                <a:cs typeface="Arial"/>
+                <a:sym typeface="Arial"/>
+              </a:rPr>
+              <a:t> and rotation</a:t>
+            </a:r>
+            <a:endParaRPr dirty="0">
               <a:latin typeface="Arial"/>
               <a:ea typeface="Arial"/>
               <a:cs typeface="Arial"/>
@@ -3182,7 +3316,7 @@
       </p:sp>
       <p:pic>
         <p:nvPicPr>
-          <p:cNvPr id="141" name="image5.png"/>
+          <p:cNvPr id="2" name="Picture 1"/>
           <p:cNvPicPr>
             <a:picLocks noChangeAspect="1"/>
           </p:cNvPicPr>
@@ -3190,7 +3324,11 @@
         </p:nvPicPr>
         <p:blipFill>
           <a:blip r:embed="rId2">
-            <a:extLst/>
+            <a:extLst>
+              <a:ext uri="{28A0092B-C50C-407E-A947-70E740481C1C}">
+                <a14:useLocalDpi xmlns:a14="http://schemas.microsoft.com/office/drawing/2010/main" val="0"/>
+              </a:ext>
+            </a:extLst>
           </a:blip>
           <a:stretch>
             <a:fillRect/>
@@ -3198,20 +3336,17 @@
         </p:blipFill>
         <p:spPr>
           <a:xfrm>
-            <a:off x="776753" y="469404"/>
-            <a:ext cx="4641047" cy="4948294"/>
+            <a:off x="4308218" y="193169"/>
+            <a:ext cx="2952897" cy="4320650"/>
           </a:xfrm>
           <a:prstGeom prst="rect">
             <a:avLst/>
           </a:prstGeom>
-          <a:ln w="12700">
-            <a:miter lim="400000"/>
-          </a:ln>
         </p:spPr>
       </p:pic>
       <p:pic>
         <p:nvPicPr>
-          <p:cNvPr id="142" name="image6.png"/>
+          <p:cNvPr id="3" name="Picture 2"/>
           <p:cNvPicPr>
             <a:picLocks noChangeAspect="1"/>
           </p:cNvPicPr>
@@ -3219,7 +3354,11 @@
         </p:nvPicPr>
         <p:blipFill>
           <a:blip r:embed="rId3">
-            <a:extLst/>
+            <a:extLst>
+              <a:ext uri="{28A0092B-C50C-407E-A947-70E740481C1C}">
+                <a14:useLocalDpi xmlns:a14="http://schemas.microsoft.com/office/drawing/2010/main" val="0"/>
+              </a:ext>
+            </a:extLst>
           </a:blip>
           <a:stretch>
             <a:fillRect/>
@@ -3227,15 +3366,42 @@
         </p:blipFill>
         <p:spPr>
           <a:xfrm>
-            <a:off x="6079948" y="455350"/>
-            <a:ext cx="4613047" cy="4976403"/>
+            <a:off x="491756" y="193169"/>
+            <a:ext cx="2989744" cy="4316500"/>
           </a:xfrm>
           <a:prstGeom prst="rect">
             <a:avLst/>
           </a:prstGeom>
-          <a:ln w="12700">
-            <a:miter lim="400000"/>
-          </a:ln>
+        </p:spPr>
+      </p:pic>
+      <p:pic>
+        <p:nvPicPr>
+          <p:cNvPr id="4" name="Picture 3"/>
+          <p:cNvPicPr>
+            <a:picLocks noChangeAspect="1"/>
+          </p:cNvPicPr>
+          <p:nvPr/>
+        </p:nvPicPr>
+        <p:blipFill>
+          <a:blip r:embed="rId4">
+            <a:extLst>
+              <a:ext uri="{28A0092B-C50C-407E-A947-70E740481C1C}">
+                <a14:useLocalDpi xmlns:a14="http://schemas.microsoft.com/office/drawing/2010/main" val="0"/>
+              </a:ext>
+            </a:extLst>
+          </a:blip>
+          <a:stretch>
+            <a:fillRect/>
+          </a:stretch>
+        </p:blipFill>
+        <p:spPr>
+          <a:xfrm>
+            <a:off x="8087834" y="193169"/>
+            <a:ext cx="3012557" cy="4316500"/>
+          </a:xfrm>
+          <a:prstGeom prst="rect">
+            <a:avLst/>
+          </a:prstGeom>
         </p:spPr>
       </p:pic>
     </p:spTree>
@@ -3243,12 +3409,12 @@
   <p:clrMapOvr>
     <a:masterClrMapping/>
   </p:clrMapOvr>
-  <p:transition xmlns:p14="http://schemas.microsoft.com/office/powerpoint/2010/main" spd="med" advClick="1" p14:dur="1000"/>
+  <p:transition spd="slow"/>
 </p:sld>
 </file>
 
 <file path=ppt/slides/slide11.xml><?xml version="1.0" encoding="utf-8"?>
-<p:sld xmlns:a="http://schemas.openxmlformats.org/drawingml/2006/main" xmlns:r="http://schemas.openxmlformats.org/officeDocument/2006/relationships" xmlns:p="http://schemas.openxmlformats.org/presentationml/2006/main" showMasterSp="1" showMasterPhAnim="1">
+<p:sld xmlns:a="http://schemas.openxmlformats.org/drawingml/2006/main" xmlns:r="http://schemas.openxmlformats.org/officeDocument/2006/relationships" xmlns:p="http://schemas.openxmlformats.org/presentationml/2006/main">
   <p:cSld>
     <p:spTree>
       <p:nvGrpSpPr>
@@ -3293,7 +3459,7 @@
           </a:bodyPr>
           <a:lstStyle>
             <a:lvl1pPr algn="ctr">
-              <a:defRPr b="1" sz="5400">
+              <a:defRPr sz="5400" b="1">
                 <a:ln w="12700">
                   <a:solidFill>
                     <a:srgbClr val="3A5274"/>
@@ -3303,7 +3469,7 @@
                   <a:srgbClr val="EBEAEA"/>
                 </a:solidFill>
                 <a:effectLst>
-                  <a:outerShdw sx="100000" sy="100000" kx="0" ky="0" algn="b" rotWithShape="0" blurRad="38100" dist="20320" dir="1800000">
+                  <a:outerShdw blurRad="38100" dist="20320" dir="1800000" rotWithShape="0">
                     <a:srgbClr val="000000">
                       <a:alpha val="40000"/>
                     </a:srgbClr>
@@ -3314,7 +3480,7 @@
           </a:lstStyle>
           <a:p>
             <a:pPr>
-              <a:defRPr b="0" sz="1800">
+              <a:defRPr sz="1800" b="0">
                 <a:ln>
                   <a:noFill/>
                 </a:ln>
@@ -3325,7 +3491,7 @@
               </a:defRPr>
             </a:pPr>
             <a:r>
-              <a:rPr b="1" sz="5400">
+              <a:rPr sz="5400" b="1">
                 <a:ln w="12700">
                   <a:solidFill>
                     <a:srgbClr val="3A5274"/>
@@ -3335,7 +3501,7 @@
                   <a:srgbClr val="EBEAEA"/>
                 </a:solidFill>
                 <a:effectLst>
-                  <a:outerShdw sx="100000" sy="100000" kx="0" ky="0" algn="b" rotWithShape="0" blurRad="38100" dist="20320" dir="1800000">
+                  <a:outerShdw blurRad="38100" dist="20320" dir="1800000" rotWithShape="0">
                     <a:srgbClr val="000000">
                       <a:alpha val="40000"/>
                     </a:srgbClr>
@@ -3352,12 +3518,12 @@
   <p:clrMapOvr>
     <a:masterClrMapping/>
   </p:clrMapOvr>
-  <p:transition xmlns:p14="http://schemas.microsoft.com/office/powerpoint/2010/main" spd="med" advClick="1" p14:dur="1000"/>
+  <p:transition spd="slow"/>
 </p:sld>
 </file>
 
 <file path=ppt/slides/slide2.xml><?xml version="1.0" encoding="utf-8"?>
-<p:sld xmlns:a="http://schemas.openxmlformats.org/drawingml/2006/main" xmlns:r="http://schemas.openxmlformats.org/officeDocument/2006/relationships" xmlns:p="http://schemas.openxmlformats.org/presentationml/2006/main" showMasterSp="1" showMasterPhAnim="1">
+<p:sld xmlns:a="http://schemas.openxmlformats.org/drawingml/2006/main" xmlns:r="http://schemas.openxmlformats.org/officeDocument/2006/relationships" xmlns:p="http://schemas.openxmlformats.org/presentationml/2006/main">
   <p:cSld>
     <p:spTree>
       <p:nvGrpSpPr>
@@ -3376,7 +3542,9 @@
       <p:sp>
         <p:nvSpPr>
           <p:cNvPr id="113" name="Shape 113"/>
-          <p:cNvSpPr/>
+          <p:cNvSpPr>
+            <a:spLocks noGrp="1"/>
+          </p:cNvSpPr>
           <p:nvPr>
             <p:ph type="title"/>
           </p:nvPr>
@@ -3390,7 +3558,6 @@
           <a:bodyPr/>
           <a:lstStyle/>
           <a:p>
-            <a:pPr/>
             <a:r>
               <a:t> Mission</a:t>
             </a:r>
@@ -3400,7 +3567,9 @@
       <p:sp>
         <p:nvSpPr>
           <p:cNvPr id="114" name="Shape 114"/>
-          <p:cNvSpPr/>
+          <p:cNvSpPr>
+            <a:spLocks noGrp="1"/>
+          </p:cNvSpPr>
           <p:nvPr>
             <p:ph type="body" idx="1"/>
           </p:nvPr>
@@ -3418,25 +3587,22 @@
           <a:bodyPr/>
           <a:lstStyle/>
           <a:p>
-            <a:pPr/>
             <a:r>
               <a:t>Read in SVG file</a:t>
             </a:r>
           </a:p>
           <a:p>
-            <a:pPr/>
-          </a:p>
-          <a:p>
-            <a:pPr/>
+            <a:endParaRPr/>
+          </a:p>
+          <a:p>
             <a:r>
               <a:t>Parse SVG file and extract information</a:t>
             </a:r>
           </a:p>
           <a:p>
-            <a:pPr/>
-          </a:p>
-          <a:p>
-            <a:pPr/>
+            <a:endParaRPr/>
+          </a:p>
+          <a:p>
             <a:r>
               <a:t>Draw SVG file on the screen</a:t>
             </a:r>
@@ -3446,7 +3612,9 @@
       <p:sp>
         <p:nvSpPr>
           <p:cNvPr id="115" name="Shape 115"/>
-          <p:cNvSpPr/>
+          <p:cNvSpPr>
+            <a:spLocks noGrp="1"/>
+          </p:cNvSpPr>
           <p:nvPr>
             <p:ph type="sldNum" sz="quarter" idx="2"/>
           </p:nvPr>
@@ -3465,8 +3633,10 @@
           <a:bodyPr/>
           <a:lstStyle/>
           <a:p>
-            <a:pPr/>
-            <a:fld id="{86CB4B4D-7CA3-9044-876B-883B54F8677D}" type="slidenum"/>
+            <a:fld id="{86CB4B4D-7CA3-9044-876B-883B54F8677D}" type="slidenum">
+              <a:t>2</a:t>
+            </a:fld>
+            <a:endParaRPr/>
           </a:p>
         </p:txBody>
       </p:sp>
@@ -3475,12 +3645,12 @@
   <p:clrMapOvr>
     <a:masterClrMapping/>
   </p:clrMapOvr>
-  <p:transition xmlns:p14="http://schemas.microsoft.com/office/powerpoint/2010/main" spd="med" advClick="1" p14:dur="1000"/>
+  <p:transition spd="slow"/>
 </p:sld>
 </file>
 
 <file path=ppt/slides/slide3.xml><?xml version="1.0" encoding="utf-8"?>
-<p:sld xmlns:a="http://schemas.openxmlformats.org/drawingml/2006/main" xmlns:r="http://schemas.openxmlformats.org/officeDocument/2006/relationships" xmlns:p="http://schemas.openxmlformats.org/presentationml/2006/main" showMasterSp="1" showMasterPhAnim="1">
+<p:sld xmlns:a="http://schemas.openxmlformats.org/drawingml/2006/main" xmlns:r="http://schemas.openxmlformats.org/officeDocument/2006/relationships" xmlns:p="http://schemas.openxmlformats.org/presentationml/2006/main">
   <p:cSld>
     <p:spTree>
       <p:nvGrpSpPr>
@@ -3499,7 +3669,9 @@
       <p:sp>
         <p:nvSpPr>
           <p:cNvPr id="117" name="Shape 117"/>
-          <p:cNvSpPr/>
+          <p:cNvSpPr>
+            <a:spLocks noGrp="1"/>
+          </p:cNvSpPr>
           <p:nvPr>
             <p:ph type="title"/>
           </p:nvPr>
@@ -3517,7 +3689,6 @@
           <a:bodyPr/>
           <a:lstStyle/>
           <a:p>
-            <a:pPr/>
             <a:r>
               <a:t>SVG</a:t>
             </a:r>
@@ -3527,7 +3698,9 @@
       <p:sp>
         <p:nvSpPr>
           <p:cNvPr id="118" name="Shape 118"/>
-          <p:cNvSpPr/>
+          <p:cNvSpPr>
+            <a:spLocks noGrp="1"/>
+          </p:cNvSpPr>
           <p:nvPr>
             <p:ph type="body" idx="1"/>
           </p:nvPr>
@@ -3554,25 +3727,7 @@
               </a:defRPr>
             </a:pPr>
             <a:r>
-              <a:t>Scalable Vector Graphics</a:t>
-            </a:r>
-            <a:r>
-              <a:t> </a:t>
-            </a:r>
-            <a:r>
-              <a:t>which</a:t>
-            </a:r>
-            <a:r>
-              <a:t> </a:t>
-            </a:r>
-            <a:r>
-              <a:t>is</a:t>
-            </a:r>
-            <a:r>
-              <a:t> </a:t>
-            </a:r>
-            <a:r>
-              <a:t>XML-based vector image format </a:t>
+              <a:t>Scalable Vector Graphics which is XML-based vector image format </a:t>
             </a:r>
           </a:p>
           <a:p>
@@ -3584,6 +3739,7 @@
                 <a:sym typeface="Arial"/>
               </a:defRPr>
             </a:pPr>
+            <a:endParaRPr/>
           </a:p>
           <a:p>
             <a:pPr>
@@ -3607,6 +3763,7 @@
                 <a:sym typeface="Arial"/>
               </a:defRPr>
             </a:pPr>
+            <a:endParaRPr/>
           </a:p>
           <a:p>
             <a:pPr>
@@ -3628,12 +3785,12 @@
   <p:clrMapOvr>
     <a:masterClrMapping/>
   </p:clrMapOvr>
-  <p:transition xmlns:p14="http://schemas.microsoft.com/office/powerpoint/2010/main" spd="med" advClick="1" p14:dur="1000"/>
+  <p:transition spd="slow"/>
 </p:sld>
 </file>
 
 <file path=ppt/slides/slide4.xml><?xml version="1.0" encoding="utf-8"?>
-<p:sld xmlns:a="http://schemas.openxmlformats.org/drawingml/2006/main" xmlns:r="http://schemas.openxmlformats.org/officeDocument/2006/relationships" xmlns:p="http://schemas.openxmlformats.org/presentationml/2006/main" showMasterSp="1" showMasterPhAnim="1">
+<p:sld xmlns:a="http://schemas.openxmlformats.org/drawingml/2006/main" xmlns:r="http://schemas.openxmlformats.org/officeDocument/2006/relationships" xmlns:p="http://schemas.openxmlformats.org/presentationml/2006/main">
   <p:cSld>
     <p:spTree>
       <p:nvGrpSpPr>
@@ -3652,7 +3809,9 @@
       <p:sp>
         <p:nvSpPr>
           <p:cNvPr id="120" name="Shape 120"/>
-          <p:cNvSpPr/>
+          <p:cNvSpPr>
+            <a:spLocks noGrp="1"/>
+          </p:cNvSpPr>
           <p:nvPr>
             <p:ph type="title"/>
           </p:nvPr>
@@ -3670,7 +3829,6 @@
           <a:bodyPr/>
           <a:lstStyle/>
           <a:p>
-            <a:pPr/>
             <a:r>
               <a:t>Import SVG</a:t>
             </a:r>
@@ -3680,7 +3838,9 @@
       <p:sp>
         <p:nvSpPr>
           <p:cNvPr id="121" name="Shape 121"/>
-          <p:cNvSpPr/>
+          <p:cNvSpPr>
+            <a:spLocks noGrp="1"/>
+          </p:cNvSpPr>
           <p:nvPr>
             <p:ph type="body" idx="1"/>
           </p:nvPr>
@@ -3719,6 +3879,7 @@
                 <a:sym typeface="Arial"/>
               </a:defRPr>
             </a:pPr>
+            <a:endParaRPr/>
           </a:p>
           <a:p>
             <a:pPr>
@@ -3742,6 +3903,7 @@
                 <a:sym typeface="Arial"/>
               </a:defRPr>
             </a:pPr>
+            <a:endParaRPr/>
           </a:p>
           <a:p>
             <a:pPr>
@@ -3765,6 +3927,7 @@
                 <a:sym typeface="Arial"/>
               </a:defRPr>
             </a:pPr>
+            <a:endParaRPr/>
           </a:p>
           <a:p>
             <a:pPr>
@@ -3815,12 +3978,12 @@
   <p:clrMapOvr>
     <a:masterClrMapping/>
   </p:clrMapOvr>
-  <p:transition xmlns:p14="http://schemas.microsoft.com/office/powerpoint/2010/main" spd="med" advClick="1" p14:dur="1000"/>
+  <p:transition spd="slow"/>
 </p:sld>
 </file>
 
 <file path=ppt/slides/slide5.xml><?xml version="1.0" encoding="utf-8"?>
-<p:sld xmlns:a="http://schemas.openxmlformats.org/drawingml/2006/main" xmlns:r="http://schemas.openxmlformats.org/officeDocument/2006/relationships" xmlns:p="http://schemas.openxmlformats.org/presentationml/2006/main" showMasterSp="1" showMasterPhAnim="1">
+<p:sld xmlns:a="http://schemas.openxmlformats.org/drawingml/2006/main" xmlns:r="http://schemas.openxmlformats.org/officeDocument/2006/relationships" xmlns:p="http://schemas.openxmlformats.org/presentationml/2006/main">
   <p:cSld>
     <p:spTree>
       <p:nvGrpSpPr>
@@ -3839,7 +4002,9 @@
       <p:sp>
         <p:nvSpPr>
           <p:cNvPr id="124" name="Shape 124"/>
-          <p:cNvSpPr/>
+          <p:cNvSpPr>
+            <a:spLocks noGrp="1"/>
+          </p:cNvSpPr>
           <p:nvPr>
             <p:ph type="body" sz="quarter" idx="1"/>
           </p:nvPr>
@@ -3866,22 +4031,7 @@
               </a:defRPr>
             </a:pPr>
             <a:r>
-              <a:t>Function1, </a:t>
-            </a:r>
-            <a:r>
-              <a:t>import SVG into</a:t>
-            </a:r>
-            <a:r>
-              <a:t> </a:t>
-            </a:r>
-            <a:r>
-              <a:t>document</a:t>
-            </a:r>
-            <a:r>
-              <a:t> </a:t>
-            </a:r>
-            <a:r>
-              <a:t>viewer</a:t>
+              <a:t>Function1, import SVG into document viewer</a:t>
             </a:r>
           </a:p>
         </p:txBody>
@@ -3920,12 +4070,12 @@
   <p:clrMapOvr>
     <a:masterClrMapping/>
   </p:clrMapOvr>
-  <p:transition xmlns:p14="http://schemas.microsoft.com/office/powerpoint/2010/main" spd="med" advClick="1" p14:dur="1000"/>
+  <p:transition spd="slow"/>
 </p:sld>
 </file>
 
 <file path=ppt/slides/slide6.xml><?xml version="1.0" encoding="utf-8"?>
-<p:sld xmlns:a="http://schemas.openxmlformats.org/drawingml/2006/main" xmlns:r="http://schemas.openxmlformats.org/officeDocument/2006/relationships" xmlns:p="http://schemas.openxmlformats.org/presentationml/2006/main" showMasterSp="1" showMasterPhAnim="1">
+<p:sld xmlns:a="http://schemas.openxmlformats.org/drawingml/2006/main" xmlns:r="http://schemas.openxmlformats.org/officeDocument/2006/relationships" xmlns:p="http://schemas.openxmlformats.org/presentationml/2006/main">
   <p:cSld>
     <p:spTree>
       <p:nvGrpSpPr>
@@ -3944,7 +4094,9 @@
       <p:sp>
         <p:nvSpPr>
           <p:cNvPr id="127" name="Shape 127"/>
-          <p:cNvSpPr/>
+          <p:cNvSpPr>
+            <a:spLocks noGrp="1"/>
+          </p:cNvSpPr>
           <p:nvPr>
             <p:ph type="title"/>
           </p:nvPr>
@@ -3962,7 +4114,6 @@
           <a:bodyPr/>
           <a:lstStyle/>
           <a:p>
-            <a:pPr/>
             <a:r>
               <a:t>Parse</a:t>
             </a:r>
@@ -3972,7 +4123,9 @@
       <p:sp>
         <p:nvSpPr>
           <p:cNvPr id="128" name="Shape 128"/>
-          <p:cNvSpPr/>
+          <p:cNvSpPr>
+            <a:spLocks noGrp="1"/>
+          </p:cNvSpPr>
           <p:nvPr>
             <p:ph type="body" idx="1"/>
           </p:nvPr>
@@ -3999,52 +4152,7 @@
               </a:defRPr>
             </a:pPr>
             <a:r>
-              <a:t>Use</a:t>
-            </a:r>
-            <a:r>
-              <a:t> </a:t>
-            </a:r>
-            <a:r>
-              <a:t>regex</a:t>
-            </a:r>
-            <a:r>
-              <a:t> </a:t>
-            </a:r>
-            <a:r>
-              <a:t>to</a:t>
-            </a:r>
-            <a:r>
-              <a:t> </a:t>
-            </a:r>
-            <a:r>
-              <a:t>extract</a:t>
-            </a:r>
-            <a:r>
-              <a:t> </a:t>
-            </a:r>
-            <a:r>
-              <a:t>attributes</a:t>
-            </a:r>
-            <a:r>
-              <a:t> </a:t>
-            </a:r>
-            <a:r>
-              <a:t>from</a:t>
-            </a:r>
-            <a:r>
-              <a:t> </a:t>
-            </a:r>
-            <a:r>
-              <a:t>each</a:t>
-            </a:r>
-            <a:r>
-              <a:t> </a:t>
-            </a:r>
-            <a:r>
-              <a:t>shape</a:t>
-            </a:r>
-            <a:r>
-              <a:t> </a:t>
+              <a:t>Use regex to extract attributes from each shape </a:t>
             </a:r>
           </a:p>
           <a:p>
@@ -4056,6 +4164,7 @@
                 <a:sym typeface="Arial"/>
               </a:defRPr>
             </a:pPr>
+            <a:endParaRPr/>
           </a:p>
           <a:p>
             <a:pPr>
@@ -4067,73 +4176,7 @@
               </a:defRPr>
             </a:pPr>
             <a:r>
-              <a:t>Save</a:t>
-            </a:r>
-            <a:r>
-              <a:t> </a:t>
-            </a:r>
-            <a:r>
-              <a:t>these</a:t>
-            </a:r>
-            <a:r>
-              <a:t> </a:t>
-            </a:r>
-            <a:r>
-              <a:t>attributes</a:t>
-            </a:r>
-            <a:r>
-              <a:t> </a:t>
-            </a:r>
-            <a:r>
-              <a:t>into</a:t>
-            </a:r>
-            <a:r>
-              <a:t> </a:t>
-            </a:r>
-            <a:r>
-              <a:t>variables</a:t>
-            </a:r>
-            <a:r>
-              <a:t> </a:t>
-            </a:r>
-            <a:r>
-              <a:t>and</a:t>
-            </a:r>
-            <a:r>
-              <a:t> </a:t>
-            </a:r>
-            <a:r>
-              <a:t>create</a:t>
-            </a:r>
-            <a:r>
-              <a:t> </a:t>
-            </a:r>
-            <a:r>
-              <a:t>get</a:t>
-            </a:r>
-            <a:r>
-              <a:t> </a:t>
-            </a:r>
-            <a:r>
-              <a:t>method</a:t>
-            </a:r>
-            <a:r>
-              <a:t> </a:t>
-            </a:r>
-            <a:r>
-              <a:t>to</a:t>
-            </a:r>
-            <a:r>
-              <a:t> </a:t>
-            </a:r>
-            <a:r>
-              <a:t>get</a:t>
-            </a:r>
-            <a:r>
-              <a:t> </a:t>
-            </a:r>
-            <a:r>
-              <a:t>them</a:t>
+              <a:t>Save these attributes into variables and create get method to get them</a:t>
             </a:r>
           </a:p>
         </p:txBody>
@@ -4172,12 +4215,12 @@
   <p:clrMapOvr>
     <a:masterClrMapping/>
   </p:clrMapOvr>
-  <p:transition xmlns:p14="http://schemas.microsoft.com/office/powerpoint/2010/main" spd="med" advClick="1" p14:dur="1000"/>
+  <p:transition spd="slow"/>
 </p:sld>
 </file>
 
 <file path=ppt/slides/slide7.xml><?xml version="1.0" encoding="utf-8"?>
-<p:sld xmlns:a="http://schemas.openxmlformats.org/drawingml/2006/main" xmlns:r="http://schemas.openxmlformats.org/officeDocument/2006/relationships" xmlns:p="http://schemas.openxmlformats.org/presentationml/2006/main" showMasterSp="1" showMasterPhAnim="1">
+<p:sld xmlns:a="http://schemas.openxmlformats.org/drawingml/2006/main" xmlns:r="http://schemas.openxmlformats.org/officeDocument/2006/relationships" xmlns:p="http://schemas.openxmlformats.org/presentationml/2006/main">
   <p:cSld>
     <p:spTree>
       <p:nvGrpSpPr>
@@ -4287,12 +4330,12 @@
   <p:clrMapOvr>
     <a:masterClrMapping/>
   </p:clrMapOvr>
-  <p:transition xmlns:p14="http://schemas.microsoft.com/office/powerpoint/2010/main" spd="med" advClick="1" p14:dur="1000"/>
+  <p:transition spd="slow"/>
 </p:sld>
 </file>
 
 <file path=ppt/slides/slide8.xml><?xml version="1.0" encoding="utf-8"?>
-<p:sld xmlns:a="http://schemas.openxmlformats.org/drawingml/2006/main" xmlns:r="http://schemas.openxmlformats.org/officeDocument/2006/relationships" xmlns:p="http://schemas.openxmlformats.org/presentationml/2006/main" showMasterSp="1" showMasterPhAnim="1">
+<p:sld xmlns:a="http://schemas.openxmlformats.org/drawingml/2006/main" xmlns:r="http://schemas.openxmlformats.org/officeDocument/2006/relationships" xmlns:p="http://schemas.openxmlformats.org/presentationml/2006/main">
   <p:cSld>
     <p:spTree>
       <p:nvGrpSpPr>
@@ -4311,7 +4354,9 @@
       <p:sp>
         <p:nvSpPr>
           <p:cNvPr id="134" name="Shape 134"/>
-          <p:cNvSpPr/>
+          <p:cNvSpPr>
+            <a:spLocks noGrp="1"/>
+          </p:cNvSpPr>
           <p:nvPr>
             <p:ph type="title"/>
           </p:nvPr>
@@ -4329,7 +4374,6 @@
           <a:bodyPr/>
           <a:lstStyle/>
           <a:p>
-            <a:pPr/>
             <a:r>
               <a:t>Shape</a:t>
             </a:r>
@@ -4339,7 +4383,9 @@
       <p:sp>
         <p:nvSpPr>
           <p:cNvPr id="135" name="Shape 135"/>
-          <p:cNvSpPr/>
+          <p:cNvSpPr>
+            <a:spLocks noGrp="1"/>
+          </p:cNvSpPr>
           <p:nvPr>
             <p:ph type="body" idx="1"/>
           </p:nvPr>
@@ -4366,49 +4412,7 @@
               </a:defRPr>
             </a:pPr>
             <a:r>
-              <a:t>Import</a:t>
-            </a:r>
-            <a:r>
-              <a:t> </a:t>
-            </a:r>
-            <a:r>
-              <a:t>SVG</a:t>
-            </a:r>
-            <a:r>
-              <a:t> </a:t>
-            </a:r>
-            <a:r>
-              <a:t>class</a:t>
-            </a:r>
-            <a:r>
-              <a:t> </a:t>
-            </a:r>
-            <a:r>
-              <a:t>passes</a:t>
-            </a:r>
-            <a:r>
-              <a:t> </a:t>
-            </a:r>
-            <a:r>
-              <a:t>arguments</a:t>
-            </a:r>
-            <a:r>
-              <a:t> </a:t>
-            </a:r>
-            <a:r>
-              <a:t>into</a:t>
-            </a:r>
-            <a:r>
-              <a:t> </a:t>
-            </a:r>
-            <a:r>
-              <a:t>Shape</a:t>
-            </a:r>
-            <a:r>
-              <a:t> </a:t>
-            </a:r>
-            <a:r>
-              <a:t>class</a:t>
+              <a:t>Import SVG class passes arguments into Shape class</a:t>
             </a:r>
           </a:p>
           <a:p>
@@ -4420,6 +4424,7 @@
                 <a:sym typeface="Arial"/>
               </a:defRPr>
             </a:pPr>
+            <a:endParaRPr/>
           </a:p>
           <a:p>
             <a:pPr>
@@ -4431,67 +4436,7 @@
               </a:defRPr>
             </a:pPr>
             <a:r>
-              <a:t>Shape</a:t>
-            </a:r>
-            <a:r>
-              <a:t> </a:t>
-            </a:r>
-            <a:r>
-              <a:t>classes</a:t>
-            </a:r>
-            <a:r>
-              <a:t> </a:t>
-            </a:r>
-            <a:r>
-              <a:t>call</a:t>
-            </a:r>
-            <a:r>
-              <a:t> </a:t>
-            </a:r>
-            <a:r>
-              <a:t>method</a:t>
-            </a:r>
-            <a:r>
-              <a:t> </a:t>
-            </a:r>
-            <a:r>
-              <a:t>in</a:t>
-            </a:r>
-            <a:r>
-              <a:t> </a:t>
-            </a:r>
-            <a:r>
-              <a:t>the</a:t>
-            </a:r>
-            <a:r>
-              <a:t> </a:t>
-            </a:r>
-            <a:r>
-              <a:t>Batik</a:t>
-            </a:r>
-            <a:r>
-              <a:t> </a:t>
-            </a:r>
-            <a:r>
-              <a:t>library</a:t>
-            </a:r>
-            <a:r>
-              <a:t> </a:t>
-            </a:r>
-            <a:r>
-              <a:t>to</a:t>
-            </a:r>
-            <a:r>
-              <a:t> </a:t>
-            </a:r>
-            <a:r>
-              <a:t>draw</a:t>
-            </a:r>
-            <a:r>
-              <a:t> </a:t>
-            </a:r>
-            <a:r>
-              <a:t>themselves.</a:t>
+              <a:t>Shape classes call method in the Batik library to draw themselves.</a:t>
             </a:r>
           </a:p>
           <a:p>
@@ -4503,6 +4448,7 @@
                 <a:sym typeface="Arial"/>
               </a:defRPr>
             </a:pPr>
+            <a:endParaRPr/>
           </a:p>
           <a:p>
             <a:pPr>
@@ -4514,37 +4460,7 @@
               </a:defRPr>
             </a:pPr>
             <a:r>
-              <a:t>Save</a:t>
-            </a:r>
-            <a:r>
-              <a:t> </a:t>
-            </a:r>
-            <a:r>
-              <a:t>the</a:t>
-            </a:r>
-            <a:r>
-              <a:t> </a:t>
-            </a:r>
-            <a:r>
-              <a:t>shapes</a:t>
-            </a:r>
-            <a:r>
-              <a:t> </a:t>
-            </a:r>
-            <a:r>
-              <a:t>into</a:t>
-            </a:r>
-            <a:r>
-              <a:t> </a:t>
-            </a:r>
-            <a:r>
-              <a:t>DOM</a:t>
-            </a:r>
-            <a:r>
-              <a:t> </a:t>
-            </a:r>
-            <a:r>
-              <a:t>tree</a:t>
+              <a:t>Save the shapes into DOM tree</a:t>
             </a:r>
           </a:p>
           <a:p>
@@ -4556,6 +4472,7 @@
                 <a:sym typeface="Arial"/>
               </a:defRPr>
             </a:pPr>
+            <a:endParaRPr/>
           </a:p>
           <a:p>
             <a:pPr>
@@ -4567,55 +4484,7 @@
               </a:defRPr>
             </a:pPr>
             <a:r>
-              <a:t>Add</a:t>
-            </a:r>
-            <a:r>
-              <a:t> </a:t>
-            </a:r>
-            <a:r>
-              <a:t>the</a:t>
-            </a:r>
-            <a:r>
-              <a:t> </a:t>
-            </a:r>
-            <a:r>
-              <a:t>tree</a:t>
-            </a:r>
-            <a:r>
-              <a:t> </a:t>
-            </a:r>
-            <a:r>
-              <a:t>to</a:t>
-            </a:r>
-            <a:r>
-              <a:t> </a:t>
-            </a:r>
-            <a:r>
-              <a:t>JSVG</a:t>
-            </a:r>
-            <a:r>
-              <a:t> </a:t>
-            </a:r>
-            <a:r>
-              <a:t>Canvas</a:t>
-            </a:r>
-            <a:r>
-              <a:t> </a:t>
-            </a:r>
-            <a:r>
-              <a:t>to</a:t>
-            </a:r>
-            <a:r>
-              <a:t> </a:t>
-            </a:r>
-            <a:r>
-              <a:t>display</a:t>
-            </a:r>
-            <a:r>
-              <a:t> </a:t>
-            </a:r>
-            <a:r>
-              <a:t>SVG</a:t>
+              <a:t>Add the tree to JSVG Canvas to display SVG</a:t>
             </a:r>
           </a:p>
         </p:txBody>
@@ -4625,12 +4494,12 @@
   <p:clrMapOvr>
     <a:masterClrMapping/>
   </p:clrMapOvr>
-  <p:transition xmlns:p14="http://schemas.microsoft.com/office/powerpoint/2010/main" spd="med" advClick="1" p14:dur="1000"/>
+  <p:transition spd="slow"/>
 </p:sld>
 </file>
 
 <file path=ppt/slides/slide9.xml><?xml version="1.0" encoding="utf-8"?>
-<p:sld xmlns:a="http://schemas.openxmlformats.org/drawingml/2006/main" xmlns:r="http://schemas.openxmlformats.org/officeDocument/2006/relationships" xmlns:p="http://schemas.openxmlformats.org/presentationml/2006/main" showMasterSp="1" showMasterPhAnim="1">
+<p:sld xmlns:a="http://schemas.openxmlformats.org/drawingml/2006/main" xmlns:r="http://schemas.openxmlformats.org/officeDocument/2006/relationships" xmlns:p="http://schemas.openxmlformats.org/presentationml/2006/main">
   <p:cSld>
     <p:spTree>
       <p:nvGrpSpPr>
@@ -4692,7 +4561,6 @@
             </a:lvl1pPr>
           </a:lstStyle>
           <a:p>
-            <a:pPr/>
             <a:r>
               <a:t>Function 3, draw SVG on the screen</a:t>
             </a:r>
@@ -4733,12 +4601,12 @@
   <p:clrMapOvr>
     <a:masterClrMapping/>
   </p:clrMapOvr>
-  <p:transition xmlns:p14="http://schemas.microsoft.com/office/powerpoint/2010/main" spd="med" advClick="1" p14:dur="1000"/>
+  <p:transition spd="slow"/>
 </p:sld>
 </file>
 
 <file path=ppt/theme/theme1.xml><?xml version="1.0" encoding="utf-8"?>
-<a:theme xmlns:a="http://schemas.openxmlformats.org/drawingml/2006/main" xmlns:r="http://schemas.openxmlformats.org/officeDocument/2006/relationships" name="Default">
+<a:theme xmlns:a="http://schemas.openxmlformats.org/drawingml/2006/main" name="Default">
   <a:themeElements>
     <a:clrScheme name="Default">
       <a:dk1>
@@ -4940,7 +4808,7 @@
         <a:effectLst/>
         <a:sp3d/>
       </a:spPr>
-      <a:bodyPr rot="0" spcFirstLastPara="1" vertOverflow="overflow" horzOverflow="overflow" vert="horz" wrap="square" lIns="45719" tIns="45719" rIns="45719" bIns="45719" numCol="1" spcCol="38100" rtlCol="0" anchor="ctr" upright="0">
+      <a:bodyPr rot="0" spcFirstLastPara="1" vertOverflow="overflow" horzOverflow="overflow" vert="horz" wrap="square" lIns="45719" tIns="45719" rIns="45719" bIns="45719" numCol="1" spcCol="38100" rtlCol="0" anchor="ctr">
         <a:spAutoFit/>
       </a:bodyPr>
       <a:lstStyle>
@@ -4959,7 +4827,7 @@
           <a:buFontTx/>
           <a:buNone/>
           <a:tabLst/>
-          <a:defRPr b="0" baseline="0" cap="none" i="0" spc="0" strike="noStrike" sz="1800" u="none" kumimoji="0" normalizeH="0">
+          <a:defRPr kumimoji="0" sz="1800" b="0" i="0" u="none" strike="noStrike" cap="none" spc="0" normalizeH="0" baseline="0">
             <a:ln>
               <a:noFill/>
             </a:ln>
@@ -4989,7 +4857,7 @@
           <a:buFontTx/>
           <a:buNone/>
           <a:tabLst/>
-          <a:defRPr b="0" baseline="0" cap="none" i="0" spc="0" strike="noStrike" sz="1800" u="none" kumimoji="0" normalizeH="0">
+          <a:defRPr kumimoji="0" sz="1800" b="0" i="0" u="none" strike="noStrike" cap="none" spc="0" normalizeH="0" baseline="0">
             <a:ln>
               <a:noFill/>
             </a:ln>
@@ -5015,7 +4883,7 @@
           <a:buFontTx/>
           <a:buNone/>
           <a:tabLst/>
-          <a:defRPr b="0" baseline="0" cap="none" i="0" spc="0" strike="noStrike" sz="1800" u="none" kumimoji="0" normalizeH="0">
+          <a:defRPr kumimoji="0" sz="1800" b="0" i="0" u="none" strike="noStrike" cap="none" spc="0" normalizeH="0" baseline="0">
             <a:ln>
               <a:noFill/>
             </a:ln>
@@ -5041,7 +4909,7 @@
           <a:buFontTx/>
           <a:buNone/>
           <a:tabLst/>
-          <a:defRPr b="0" baseline="0" cap="none" i="0" spc="0" strike="noStrike" sz="1800" u="none" kumimoji="0" normalizeH="0">
+          <a:defRPr kumimoji="0" sz="1800" b="0" i="0" u="none" strike="noStrike" cap="none" spc="0" normalizeH="0" baseline="0">
             <a:ln>
               <a:noFill/>
             </a:ln>
@@ -5067,7 +4935,7 @@
           <a:buFontTx/>
           <a:buNone/>
           <a:tabLst/>
-          <a:defRPr b="0" baseline="0" cap="none" i="0" spc="0" strike="noStrike" sz="1800" u="none" kumimoji="0" normalizeH="0">
+          <a:defRPr kumimoji="0" sz="1800" b="0" i="0" u="none" strike="noStrike" cap="none" spc="0" normalizeH="0" baseline="0">
             <a:ln>
               <a:noFill/>
             </a:ln>
@@ -5093,7 +4961,7 @@
           <a:buFontTx/>
           <a:buNone/>
           <a:tabLst/>
-          <a:defRPr b="0" baseline="0" cap="none" i="0" spc="0" strike="noStrike" sz="1800" u="none" kumimoji="0" normalizeH="0">
+          <a:defRPr kumimoji="0" sz="1800" b="0" i="0" u="none" strike="noStrike" cap="none" spc="0" normalizeH="0" baseline="0">
             <a:ln>
               <a:noFill/>
             </a:ln>
@@ -5119,7 +4987,7 @@
           <a:buFontTx/>
           <a:buNone/>
           <a:tabLst/>
-          <a:defRPr b="0" baseline="0" cap="none" i="0" spc="0" strike="noStrike" sz="1800" u="none" kumimoji="0" normalizeH="0">
+          <a:defRPr kumimoji="0" sz="1800" b="0" i="0" u="none" strike="noStrike" cap="none" spc="0" normalizeH="0" baseline="0">
             <a:ln>
               <a:noFill/>
             </a:ln>
@@ -5145,7 +5013,7 @@
           <a:buFontTx/>
           <a:buNone/>
           <a:tabLst/>
-          <a:defRPr b="0" baseline="0" cap="none" i="0" spc="0" strike="noStrike" sz="1800" u="none" kumimoji="0" normalizeH="0">
+          <a:defRPr kumimoji="0" sz="1800" b="0" i="0" u="none" strike="noStrike" cap="none" spc="0" normalizeH="0" baseline="0">
             <a:ln>
               <a:noFill/>
             </a:ln>
@@ -5171,7 +5039,7 @@
           <a:buFontTx/>
           <a:buNone/>
           <a:tabLst/>
-          <a:defRPr b="0" baseline="0" cap="none" i="0" spc="0" strike="noStrike" sz="1800" u="none" kumimoji="0" normalizeH="0">
+          <a:defRPr kumimoji="0" sz="1800" b="0" i="0" u="none" strike="noStrike" cap="none" spc="0" normalizeH="0" baseline="0">
             <a:ln>
               <a:noFill/>
             </a:ln>
@@ -5197,7 +5065,7 @@
           <a:buFontTx/>
           <a:buNone/>
           <a:tabLst/>
-          <a:defRPr b="0" baseline="0" cap="none" i="0" spc="0" strike="noStrike" sz="1800" u="none" kumimoji="0" normalizeH="0">
+          <a:defRPr kumimoji="0" sz="1800" b="0" i="0" u="none" strike="noStrike" cap="none" spc="0" normalizeH="0" baseline="0">
             <a:ln>
               <a:noFill/>
             </a:ln>
@@ -5210,9 +5078,15 @@
         </a:lvl9pPr>
       </a:lstStyle>
       <a:style>
-        <a:lnRef idx="0"/>
-        <a:fillRef idx="0"/>
-        <a:effectRef idx="0"/>
+        <a:lnRef idx="0">
+          <a:scrgbClr r="0" g="0" b="0"/>
+        </a:lnRef>
+        <a:fillRef idx="0">
+          <a:scrgbClr r="0" g="0" b="0"/>
+        </a:fillRef>
+        <a:effectRef idx="0">
+          <a:scrgbClr r="0" g="0" b="0"/>
+        </a:effectRef>
         <a:fontRef idx="none"/>
       </a:style>
     </a:spDef>
@@ -5229,7 +5103,7 @@
         <a:effectLst/>
         <a:sp3d/>
       </a:spPr>
-      <a:bodyPr rot="0" spcFirstLastPara="1" vertOverflow="overflow" horzOverflow="overflow" vert="horz" wrap="square" lIns="91439" tIns="45719" rIns="91439" bIns="45719" numCol="1" spcCol="38100" rtlCol="0" anchor="t" upright="0">
+      <a:bodyPr rot="0" spcFirstLastPara="1" vertOverflow="overflow" horzOverflow="overflow" vert="horz" wrap="square" lIns="91439" tIns="45719" rIns="91439" bIns="45719" numCol="1" spcCol="38100" rtlCol="0" anchor="t">
         <a:noAutofit/>
       </a:bodyPr>
       <a:lstStyle>
@@ -5248,7 +5122,7 @@
           <a:buFontTx/>
           <a:buNone/>
           <a:tabLst/>
-          <a:defRPr b="0" baseline="0" cap="none" i="0" spc="0" strike="noStrike" sz="1800" u="none" kumimoji="0" normalizeH="0">
+          <a:defRPr kumimoji="0" sz="1800" b="0" i="0" u="none" strike="noStrike" cap="none" spc="0" normalizeH="0" baseline="0">
             <a:ln>
               <a:noFill/>
             </a:ln>
@@ -5274,7 +5148,7 @@
           <a:buFontTx/>
           <a:buNone/>
           <a:tabLst/>
-          <a:defRPr b="0" baseline="0" cap="none" i="0" spc="0" strike="noStrike" sz="1800" u="none" kumimoji="0" normalizeH="0">
+          <a:defRPr kumimoji="0" sz="1800" b="0" i="0" u="none" strike="noStrike" cap="none" spc="0" normalizeH="0" baseline="0">
             <a:ln>
               <a:noFill/>
             </a:ln>
@@ -5300,7 +5174,7 @@
           <a:buFontTx/>
           <a:buNone/>
           <a:tabLst/>
-          <a:defRPr b="0" baseline="0" cap="none" i="0" spc="0" strike="noStrike" sz="1800" u="none" kumimoji="0" normalizeH="0">
+          <a:defRPr kumimoji="0" sz="1800" b="0" i="0" u="none" strike="noStrike" cap="none" spc="0" normalizeH="0" baseline="0">
             <a:ln>
               <a:noFill/>
             </a:ln>
@@ -5326,7 +5200,7 @@
           <a:buFontTx/>
           <a:buNone/>
           <a:tabLst/>
-          <a:defRPr b="0" baseline="0" cap="none" i="0" spc="0" strike="noStrike" sz="1800" u="none" kumimoji="0" normalizeH="0">
+          <a:defRPr kumimoji="0" sz="1800" b="0" i="0" u="none" strike="noStrike" cap="none" spc="0" normalizeH="0" baseline="0">
             <a:ln>
               <a:noFill/>
             </a:ln>
@@ -5352,7 +5226,7 @@
           <a:buFontTx/>
           <a:buNone/>
           <a:tabLst/>
-          <a:defRPr b="0" baseline="0" cap="none" i="0" spc="0" strike="noStrike" sz="1800" u="none" kumimoji="0" normalizeH="0">
+          <a:defRPr kumimoji="0" sz="1800" b="0" i="0" u="none" strike="noStrike" cap="none" spc="0" normalizeH="0" baseline="0">
             <a:ln>
               <a:noFill/>
             </a:ln>
@@ -5378,7 +5252,7 @@
           <a:buFontTx/>
           <a:buNone/>
           <a:tabLst/>
-          <a:defRPr b="0" baseline="0" cap="none" i="0" spc="0" strike="noStrike" sz="1800" u="none" kumimoji="0" normalizeH="0">
+          <a:defRPr kumimoji="0" sz="1800" b="0" i="0" u="none" strike="noStrike" cap="none" spc="0" normalizeH="0" baseline="0">
             <a:ln>
               <a:noFill/>
             </a:ln>
@@ -5404,7 +5278,7 @@
           <a:buFontTx/>
           <a:buNone/>
           <a:tabLst/>
-          <a:defRPr b="0" baseline="0" cap="none" i="0" spc="0" strike="noStrike" sz="1800" u="none" kumimoji="0" normalizeH="0">
+          <a:defRPr kumimoji="0" sz="1800" b="0" i="0" u="none" strike="noStrike" cap="none" spc="0" normalizeH="0" baseline="0">
             <a:ln>
               <a:noFill/>
             </a:ln>
@@ -5430,7 +5304,7 @@
           <a:buFontTx/>
           <a:buNone/>
           <a:tabLst/>
-          <a:defRPr b="0" baseline="0" cap="none" i="0" spc="0" strike="noStrike" sz="1800" u="none" kumimoji="0" normalizeH="0">
+          <a:defRPr kumimoji="0" sz="1800" b="0" i="0" u="none" strike="noStrike" cap="none" spc="0" normalizeH="0" baseline="0">
             <a:ln>
               <a:noFill/>
             </a:ln>
@@ -5456,7 +5330,7 @@
           <a:buFontTx/>
           <a:buNone/>
           <a:tabLst/>
-          <a:defRPr b="0" baseline="0" cap="none" i="0" spc="0" strike="noStrike" sz="1800" u="none" kumimoji="0" normalizeH="0">
+          <a:defRPr kumimoji="0" sz="1800" b="0" i="0" u="none" strike="noStrike" cap="none" spc="0" normalizeH="0" baseline="0">
             <a:ln>
               <a:noFill/>
             </a:ln>
@@ -5482,7 +5356,7 @@
           <a:buFontTx/>
           <a:buNone/>
           <a:tabLst/>
-          <a:defRPr b="0" baseline="0" cap="none" i="0" spc="0" strike="noStrike" sz="1800" u="none" kumimoji="0" normalizeH="0">
+          <a:defRPr kumimoji="0" sz="1800" b="0" i="0" u="none" strike="noStrike" cap="none" spc="0" normalizeH="0" baseline="0">
             <a:ln>
               <a:noFill/>
             </a:ln>
@@ -5495,9 +5369,15 @@
         </a:lvl9pPr>
       </a:lstStyle>
       <a:style>
-        <a:lnRef idx="0"/>
-        <a:fillRef idx="0"/>
-        <a:effectRef idx="0"/>
+        <a:lnRef idx="0">
+          <a:scrgbClr r="0" g="0" b="0"/>
+        </a:lnRef>
+        <a:fillRef idx="0">
+          <a:scrgbClr r="0" g="0" b="0"/>
+        </a:fillRef>
+        <a:effectRef idx="0">
+          <a:scrgbClr r="0" g="0" b="0"/>
+        </a:effectRef>
         <a:fontRef idx="none"/>
       </a:style>
     </a:lnDef>
@@ -5511,7 +5391,7 @@
         <a:effectLst/>
         <a:sp3d/>
       </a:spPr>
-      <a:bodyPr rot="0" spcFirstLastPara="1" vertOverflow="overflow" horzOverflow="overflow" vert="horz" wrap="square" lIns="45719" tIns="45719" rIns="45719" bIns="45719" numCol="1" spcCol="38100" rtlCol="0" anchor="t" upright="0">
+      <a:bodyPr rot="0" spcFirstLastPara="1" vertOverflow="overflow" horzOverflow="overflow" vert="horz" wrap="square" lIns="45719" tIns="45719" rIns="45719" bIns="45719" numCol="1" spcCol="38100" rtlCol="0" anchor="t">
         <a:spAutoFit/>
       </a:bodyPr>
       <a:lstStyle>
@@ -5530,7 +5410,7 @@
           <a:buFontTx/>
           <a:buNone/>
           <a:tabLst/>
-          <a:defRPr b="0" baseline="0" cap="none" i="0" spc="0" strike="noStrike" sz="1800" u="none" kumimoji="0" normalizeH="0">
+          <a:defRPr kumimoji="0" sz="1800" b="0" i="0" u="none" strike="noStrike" cap="none" spc="0" normalizeH="0" baseline="0">
             <a:ln>
               <a:noFill/>
             </a:ln>
@@ -5560,7 +5440,7 @@
           <a:buFontTx/>
           <a:buNone/>
           <a:tabLst/>
-          <a:defRPr b="0" baseline="0" cap="none" i="0" spc="0" strike="noStrike" sz="1800" u="none" kumimoji="0" normalizeH="0">
+          <a:defRPr kumimoji="0" sz="1800" b="0" i="0" u="none" strike="noStrike" cap="none" spc="0" normalizeH="0" baseline="0">
             <a:ln>
               <a:noFill/>
             </a:ln>
@@ -5586,7 +5466,7 @@
           <a:buFontTx/>
           <a:buNone/>
           <a:tabLst/>
-          <a:defRPr b="0" baseline="0" cap="none" i="0" spc="0" strike="noStrike" sz="1800" u="none" kumimoji="0" normalizeH="0">
+          <a:defRPr kumimoji="0" sz="1800" b="0" i="0" u="none" strike="noStrike" cap="none" spc="0" normalizeH="0" baseline="0">
             <a:ln>
               <a:noFill/>
             </a:ln>
@@ -5612,7 +5492,7 @@
           <a:buFontTx/>
           <a:buNone/>
           <a:tabLst/>
-          <a:defRPr b="0" baseline="0" cap="none" i="0" spc="0" strike="noStrike" sz="1800" u="none" kumimoji="0" normalizeH="0">
+          <a:defRPr kumimoji="0" sz="1800" b="0" i="0" u="none" strike="noStrike" cap="none" spc="0" normalizeH="0" baseline="0">
             <a:ln>
               <a:noFill/>
             </a:ln>
@@ -5638,7 +5518,7 @@
           <a:buFontTx/>
           <a:buNone/>
           <a:tabLst/>
-          <a:defRPr b="0" baseline="0" cap="none" i="0" spc="0" strike="noStrike" sz="1800" u="none" kumimoji="0" normalizeH="0">
+          <a:defRPr kumimoji="0" sz="1800" b="0" i="0" u="none" strike="noStrike" cap="none" spc="0" normalizeH="0" baseline="0">
             <a:ln>
               <a:noFill/>
             </a:ln>
@@ -5664,7 +5544,7 @@
           <a:buFontTx/>
           <a:buNone/>
           <a:tabLst/>
-          <a:defRPr b="0" baseline="0" cap="none" i="0" spc="0" strike="noStrike" sz="1800" u="none" kumimoji="0" normalizeH="0">
+          <a:defRPr kumimoji="0" sz="1800" b="0" i="0" u="none" strike="noStrike" cap="none" spc="0" normalizeH="0" baseline="0">
             <a:ln>
               <a:noFill/>
             </a:ln>
@@ -5690,7 +5570,7 @@
           <a:buFontTx/>
           <a:buNone/>
           <a:tabLst/>
-          <a:defRPr b="0" baseline="0" cap="none" i="0" spc="0" strike="noStrike" sz="1800" u="none" kumimoji="0" normalizeH="0">
+          <a:defRPr kumimoji="0" sz="1800" b="0" i="0" u="none" strike="noStrike" cap="none" spc="0" normalizeH="0" baseline="0">
             <a:ln>
               <a:noFill/>
             </a:ln>
@@ -5716,7 +5596,7 @@
           <a:buFontTx/>
           <a:buNone/>
           <a:tabLst/>
-          <a:defRPr b="0" baseline="0" cap="none" i="0" spc="0" strike="noStrike" sz="1800" u="none" kumimoji="0" normalizeH="0">
+          <a:defRPr kumimoji="0" sz="1800" b="0" i="0" u="none" strike="noStrike" cap="none" spc="0" normalizeH="0" baseline="0">
             <a:ln>
               <a:noFill/>
             </a:ln>
@@ -5742,7 +5622,7 @@
           <a:buFontTx/>
           <a:buNone/>
           <a:tabLst/>
-          <a:defRPr b="0" baseline="0" cap="none" i="0" spc="0" strike="noStrike" sz="1800" u="none" kumimoji="0" normalizeH="0">
+          <a:defRPr kumimoji="0" sz="1800" b="0" i="0" u="none" strike="noStrike" cap="none" spc="0" normalizeH="0" baseline="0">
             <a:ln>
               <a:noFill/>
             </a:ln>
@@ -5768,7 +5648,7 @@
           <a:buFontTx/>
           <a:buNone/>
           <a:tabLst/>
-          <a:defRPr b="0" baseline="0" cap="none" i="0" spc="0" strike="noStrike" sz="1800" u="none" kumimoji="0" normalizeH="0">
+          <a:defRPr kumimoji="0" sz="1800" b="0" i="0" u="none" strike="noStrike" cap="none" spc="0" normalizeH="0" baseline="0">
             <a:ln>
               <a:noFill/>
             </a:ln>
@@ -5781,18 +5661,25 @@
         </a:lvl9pPr>
       </a:lstStyle>
       <a:style>
-        <a:lnRef idx="0"/>
-        <a:fillRef idx="0"/>
-        <a:effectRef idx="0"/>
+        <a:lnRef idx="0">
+          <a:scrgbClr r="0" g="0" b="0"/>
+        </a:lnRef>
+        <a:fillRef idx="0">
+          <a:scrgbClr r="0" g="0" b="0"/>
+        </a:fillRef>
+        <a:effectRef idx="0">
+          <a:scrgbClr r="0" g="0" b="0"/>
+        </a:effectRef>
         <a:fontRef idx="none"/>
       </a:style>
     </a:txDef>
   </a:objectDefaults>
+  <a:extraClrSchemeLst/>
 </a:theme>
 </file>
 
 <file path=ppt/theme/theme2.xml><?xml version="1.0" encoding="utf-8"?>
-<a:theme xmlns:a="http://schemas.openxmlformats.org/drawingml/2006/main" xmlns:r="http://schemas.openxmlformats.org/officeDocument/2006/relationships" name="Default">
+<a:theme xmlns:a="http://schemas.openxmlformats.org/drawingml/2006/main" name="Default">
   <a:themeElements>
     <a:clrScheme name="Default">
       <a:dk1>
@@ -5994,7 +5881,7 @@
         <a:effectLst/>
         <a:sp3d/>
       </a:spPr>
-      <a:bodyPr rot="0" spcFirstLastPara="1" vertOverflow="overflow" horzOverflow="overflow" vert="horz" wrap="square" lIns="45719" tIns="45719" rIns="45719" bIns="45719" numCol="1" spcCol="38100" rtlCol="0" anchor="ctr" upright="0">
+      <a:bodyPr rot="0" spcFirstLastPara="1" vertOverflow="overflow" horzOverflow="overflow" vert="horz" wrap="square" lIns="45719" tIns="45719" rIns="45719" bIns="45719" numCol="1" spcCol="38100" rtlCol="0" anchor="ctr">
         <a:spAutoFit/>
       </a:bodyPr>
       <a:lstStyle>
@@ -6013,7 +5900,7 @@
           <a:buFontTx/>
           <a:buNone/>
           <a:tabLst/>
-          <a:defRPr b="0" baseline="0" cap="none" i="0" spc="0" strike="noStrike" sz="1800" u="none" kumimoji="0" normalizeH="0">
+          <a:defRPr kumimoji="0" sz="1800" b="0" i="0" u="none" strike="noStrike" cap="none" spc="0" normalizeH="0" baseline="0">
             <a:ln>
               <a:noFill/>
             </a:ln>
@@ -6043,7 +5930,7 @@
           <a:buFontTx/>
           <a:buNone/>
           <a:tabLst/>
-          <a:defRPr b="0" baseline="0" cap="none" i="0" spc="0" strike="noStrike" sz="1800" u="none" kumimoji="0" normalizeH="0">
+          <a:defRPr kumimoji="0" sz="1800" b="0" i="0" u="none" strike="noStrike" cap="none" spc="0" normalizeH="0" baseline="0">
             <a:ln>
               <a:noFill/>
             </a:ln>
@@ -6069,7 +5956,7 @@
           <a:buFontTx/>
           <a:buNone/>
           <a:tabLst/>
-          <a:defRPr b="0" baseline="0" cap="none" i="0" spc="0" strike="noStrike" sz="1800" u="none" kumimoji="0" normalizeH="0">
+          <a:defRPr kumimoji="0" sz="1800" b="0" i="0" u="none" strike="noStrike" cap="none" spc="0" normalizeH="0" baseline="0">
             <a:ln>
               <a:noFill/>
             </a:ln>
@@ -6095,7 +5982,7 @@
           <a:buFontTx/>
           <a:buNone/>
           <a:tabLst/>
-          <a:defRPr b="0" baseline="0" cap="none" i="0" spc="0" strike="noStrike" sz="1800" u="none" kumimoji="0" normalizeH="0">
+          <a:defRPr kumimoji="0" sz="1800" b="0" i="0" u="none" strike="noStrike" cap="none" spc="0" normalizeH="0" baseline="0">
             <a:ln>
               <a:noFill/>
             </a:ln>
@@ -6121,7 +6008,7 @@
           <a:buFontTx/>
           <a:buNone/>
           <a:tabLst/>
-          <a:defRPr b="0" baseline="0" cap="none" i="0" spc="0" strike="noStrike" sz="1800" u="none" kumimoji="0" normalizeH="0">
+          <a:defRPr kumimoji="0" sz="1800" b="0" i="0" u="none" strike="noStrike" cap="none" spc="0" normalizeH="0" baseline="0">
             <a:ln>
               <a:noFill/>
             </a:ln>
@@ -6147,7 +6034,7 @@
           <a:buFontTx/>
           <a:buNone/>
           <a:tabLst/>
-          <a:defRPr b="0" baseline="0" cap="none" i="0" spc="0" strike="noStrike" sz="1800" u="none" kumimoji="0" normalizeH="0">
+          <a:defRPr kumimoji="0" sz="1800" b="0" i="0" u="none" strike="noStrike" cap="none" spc="0" normalizeH="0" baseline="0">
             <a:ln>
               <a:noFill/>
             </a:ln>
@@ -6173,7 +6060,7 @@
           <a:buFontTx/>
           <a:buNone/>
           <a:tabLst/>
-          <a:defRPr b="0" baseline="0" cap="none" i="0" spc="0" strike="noStrike" sz="1800" u="none" kumimoji="0" normalizeH="0">
+          <a:defRPr kumimoji="0" sz="1800" b="0" i="0" u="none" strike="noStrike" cap="none" spc="0" normalizeH="0" baseline="0">
             <a:ln>
               <a:noFill/>
             </a:ln>
@@ -6199,7 +6086,7 @@
           <a:buFontTx/>
           <a:buNone/>
           <a:tabLst/>
-          <a:defRPr b="0" baseline="0" cap="none" i="0" spc="0" strike="noStrike" sz="1800" u="none" kumimoji="0" normalizeH="0">
+          <a:defRPr kumimoji="0" sz="1800" b="0" i="0" u="none" strike="noStrike" cap="none" spc="0" normalizeH="0" baseline="0">
             <a:ln>
               <a:noFill/>
             </a:ln>
@@ -6225,7 +6112,7 @@
           <a:buFontTx/>
           <a:buNone/>
           <a:tabLst/>
-          <a:defRPr b="0" baseline="0" cap="none" i="0" spc="0" strike="noStrike" sz="1800" u="none" kumimoji="0" normalizeH="0">
+          <a:defRPr kumimoji="0" sz="1800" b="0" i="0" u="none" strike="noStrike" cap="none" spc="0" normalizeH="0" baseline="0">
             <a:ln>
               <a:noFill/>
             </a:ln>
@@ -6251,7 +6138,7 @@
           <a:buFontTx/>
           <a:buNone/>
           <a:tabLst/>
-          <a:defRPr b="0" baseline="0" cap="none" i="0" spc="0" strike="noStrike" sz="1800" u="none" kumimoji="0" normalizeH="0">
+          <a:defRPr kumimoji="0" sz="1800" b="0" i="0" u="none" strike="noStrike" cap="none" spc="0" normalizeH="0" baseline="0">
             <a:ln>
               <a:noFill/>
             </a:ln>
@@ -6264,9 +6151,15 @@
         </a:lvl9pPr>
       </a:lstStyle>
       <a:style>
-        <a:lnRef idx="0"/>
-        <a:fillRef idx="0"/>
-        <a:effectRef idx="0"/>
+        <a:lnRef idx="0">
+          <a:scrgbClr r="0" g="0" b="0"/>
+        </a:lnRef>
+        <a:fillRef idx="0">
+          <a:scrgbClr r="0" g="0" b="0"/>
+        </a:fillRef>
+        <a:effectRef idx="0">
+          <a:scrgbClr r="0" g="0" b="0"/>
+        </a:effectRef>
         <a:fontRef idx="none"/>
       </a:style>
     </a:spDef>
@@ -6283,7 +6176,7 @@
         <a:effectLst/>
         <a:sp3d/>
       </a:spPr>
-      <a:bodyPr rot="0" spcFirstLastPara="1" vertOverflow="overflow" horzOverflow="overflow" vert="horz" wrap="square" lIns="91439" tIns="45719" rIns="91439" bIns="45719" numCol="1" spcCol="38100" rtlCol="0" anchor="t" upright="0">
+      <a:bodyPr rot="0" spcFirstLastPara="1" vertOverflow="overflow" horzOverflow="overflow" vert="horz" wrap="square" lIns="91439" tIns="45719" rIns="91439" bIns="45719" numCol="1" spcCol="38100" rtlCol="0" anchor="t">
         <a:noAutofit/>
       </a:bodyPr>
       <a:lstStyle>
@@ -6302,7 +6195,7 @@
           <a:buFontTx/>
           <a:buNone/>
           <a:tabLst/>
-          <a:defRPr b="0" baseline="0" cap="none" i="0" spc="0" strike="noStrike" sz="1800" u="none" kumimoji="0" normalizeH="0">
+          <a:defRPr kumimoji="0" sz="1800" b="0" i="0" u="none" strike="noStrike" cap="none" spc="0" normalizeH="0" baseline="0">
             <a:ln>
               <a:noFill/>
             </a:ln>
@@ -6328,7 +6221,7 @@
           <a:buFontTx/>
           <a:buNone/>
           <a:tabLst/>
-          <a:defRPr b="0" baseline="0" cap="none" i="0" spc="0" strike="noStrike" sz="1800" u="none" kumimoji="0" normalizeH="0">
+          <a:defRPr kumimoji="0" sz="1800" b="0" i="0" u="none" strike="noStrike" cap="none" spc="0" normalizeH="0" baseline="0">
             <a:ln>
               <a:noFill/>
             </a:ln>
@@ -6354,7 +6247,7 @@
           <a:buFontTx/>
           <a:buNone/>
           <a:tabLst/>
-          <a:defRPr b="0" baseline="0" cap="none" i="0" spc="0" strike="noStrike" sz="1800" u="none" kumimoji="0" normalizeH="0">
+          <a:defRPr kumimoji="0" sz="1800" b="0" i="0" u="none" strike="noStrike" cap="none" spc="0" normalizeH="0" baseline="0">
             <a:ln>
               <a:noFill/>
             </a:ln>
@@ -6380,7 +6273,7 @@
           <a:buFontTx/>
           <a:buNone/>
           <a:tabLst/>
-          <a:defRPr b="0" baseline="0" cap="none" i="0" spc="0" strike="noStrike" sz="1800" u="none" kumimoji="0" normalizeH="0">
+          <a:defRPr kumimoji="0" sz="1800" b="0" i="0" u="none" strike="noStrike" cap="none" spc="0" normalizeH="0" baseline="0">
             <a:ln>
               <a:noFill/>
             </a:ln>
@@ -6406,7 +6299,7 @@
           <a:buFontTx/>
           <a:buNone/>
           <a:tabLst/>
-          <a:defRPr b="0" baseline="0" cap="none" i="0" spc="0" strike="noStrike" sz="1800" u="none" kumimoji="0" normalizeH="0">
+          <a:defRPr kumimoji="0" sz="1800" b="0" i="0" u="none" strike="noStrike" cap="none" spc="0" normalizeH="0" baseline="0">
             <a:ln>
               <a:noFill/>
             </a:ln>
@@ -6432,7 +6325,7 @@
           <a:buFontTx/>
           <a:buNone/>
           <a:tabLst/>
-          <a:defRPr b="0" baseline="0" cap="none" i="0" spc="0" strike="noStrike" sz="1800" u="none" kumimoji="0" normalizeH="0">
+          <a:defRPr kumimoji="0" sz="1800" b="0" i="0" u="none" strike="noStrike" cap="none" spc="0" normalizeH="0" baseline="0">
             <a:ln>
               <a:noFill/>
             </a:ln>
@@ -6458,7 +6351,7 @@
           <a:buFontTx/>
           <a:buNone/>
           <a:tabLst/>
-          <a:defRPr b="0" baseline="0" cap="none" i="0" spc="0" strike="noStrike" sz="1800" u="none" kumimoji="0" normalizeH="0">
+          <a:defRPr kumimoji="0" sz="1800" b="0" i="0" u="none" strike="noStrike" cap="none" spc="0" normalizeH="0" baseline="0">
             <a:ln>
               <a:noFill/>
             </a:ln>
@@ -6484,7 +6377,7 @@
           <a:buFontTx/>
           <a:buNone/>
           <a:tabLst/>
-          <a:defRPr b="0" baseline="0" cap="none" i="0" spc="0" strike="noStrike" sz="1800" u="none" kumimoji="0" normalizeH="0">
+          <a:defRPr kumimoji="0" sz="1800" b="0" i="0" u="none" strike="noStrike" cap="none" spc="0" normalizeH="0" baseline="0">
             <a:ln>
               <a:noFill/>
             </a:ln>
@@ -6510,7 +6403,7 @@
           <a:buFontTx/>
           <a:buNone/>
           <a:tabLst/>
-          <a:defRPr b="0" baseline="0" cap="none" i="0" spc="0" strike="noStrike" sz="1800" u="none" kumimoji="0" normalizeH="0">
+          <a:defRPr kumimoji="0" sz="1800" b="0" i="0" u="none" strike="noStrike" cap="none" spc="0" normalizeH="0" baseline="0">
             <a:ln>
               <a:noFill/>
             </a:ln>
@@ -6536,7 +6429,7 @@
           <a:buFontTx/>
           <a:buNone/>
           <a:tabLst/>
-          <a:defRPr b="0" baseline="0" cap="none" i="0" spc="0" strike="noStrike" sz="1800" u="none" kumimoji="0" normalizeH="0">
+          <a:defRPr kumimoji="0" sz="1800" b="0" i="0" u="none" strike="noStrike" cap="none" spc="0" normalizeH="0" baseline="0">
             <a:ln>
               <a:noFill/>
             </a:ln>
@@ -6549,9 +6442,15 @@
         </a:lvl9pPr>
       </a:lstStyle>
       <a:style>
-        <a:lnRef idx="0"/>
-        <a:fillRef idx="0"/>
-        <a:effectRef idx="0"/>
+        <a:lnRef idx="0">
+          <a:scrgbClr r="0" g="0" b="0"/>
+        </a:lnRef>
+        <a:fillRef idx="0">
+          <a:scrgbClr r="0" g="0" b="0"/>
+        </a:fillRef>
+        <a:effectRef idx="0">
+          <a:scrgbClr r="0" g="0" b="0"/>
+        </a:effectRef>
         <a:fontRef idx="none"/>
       </a:style>
     </a:lnDef>
@@ -6565,7 +6464,7 @@
         <a:effectLst/>
         <a:sp3d/>
       </a:spPr>
-      <a:bodyPr rot="0" spcFirstLastPara="1" vertOverflow="overflow" horzOverflow="overflow" vert="horz" wrap="square" lIns="45719" tIns="45719" rIns="45719" bIns="45719" numCol="1" spcCol="38100" rtlCol="0" anchor="t" upright="0">
+      <a:bodyPr rot="0" spcFirstLastPara="1" vertOverflow="overflow" horzOverflow="overflow" vert="horz" wrap="square" lIns="45719" tIns="45719" rIns="45719" bIns="45719" numCol="1" spcCol="38100" rtlCol="0" anchor="t">
         <a:spAutoFit/>
       </a:bodyPr>
       <a:lstStyle>
@@ -6584,7 +6483,7 @@
           <a:buFontTx/>
           <a:buNone/>
           <a:tabLst/>
-          <a:defRPr b="0" baseline="0" cap="none" i="0" spc="0" strike="noStrike" sz="1800" u="none" kumimoji="0" normalizeH="0">
+          <a:defRPr kumimoji="0" sz="1800" b="0" i="0" u="none" strike="noStrike" cap="none" spc="0" normalizeH="0" baseline="0">
             <a:ln>
               <a:noFill/>
             </a:ln>
@@ -6614,7 +6513,7 @@
           <a:buFontTx/>
           <a:buNone/>
           <a:tabLst/>
-          <a:defRPr b="0" baseline="0" cap="none" i="0" spc="0" strike="noStrike" sz="1800" u="none" kumimoji="0" normalizeH="0">
+          <a:defRPr kumimoji="0" sz="1800" b="0" i="0" u="none" strike="noStrike" cap="none" spc="0" normalizeH="0" baseline="0">
             <a:ln>
               <a:noFill/>
             </a:ln>
@@ -6640,7 +6539,7 @@
           <a:buFontTx/>
           <a:buNone/>
           <a:tabLst/>
-          <a:defRPr b="0" baseline="0" cap="none" i="0" spc="0" strike="noStrike" sz="1800" u="none" kumimoji="0" normalizeH="0">
+          <a:defRPr kumimoji="0" sz="1800" b="0" i="0" u="none" strike="noStrike" cap="none" spc="0" normalizeH="0" baseline="0">
             <a:ln>
               <a:noFill/>
             </a:ln>
@@ -6666,7 +6565,7 @@
           <a:buFontTx/>
           <a:buNone/>
           <a:tabLst/>
-          <a:defRPr b="0" baseline="0" cap="none" i="0" spc="0" strike="noStrike" sz="1800" u="none" kumimoji="0" normalizeH="0">
+          <a:defRPr kumimoji="0" sz="1800" b="0" i="0" u="none" strike="noStrike" cap="none" spc="0" normalizeH="0" baseline="0">
             <a:ln>
               <a:noFill/>
             </a:ln>
@@ -6692,7 +6591,7 @@
           <a:buFontTx/>
           <a:buNone/>
           <a:tabLst/>
-          <a:defRPr b="0" baseline="0" cap="none" i="0" spc="0" strike="noStrike" sz="1800" u="none" kumimoji="0" normalizeH="0">
+          <a:defRPr kumimoji="0" sz="1800" b="0" i="0" u="none" strike="noStrike" cap="none" spc="0" normalizeH="0" baseline="0">
             <a:ln>
               <a:noFill/>
             </a:ln>
@@ -6718,7 +6617,7 @@
           <a:buFontTx/>
           <a:buNone/>
           <a:tabLst/>
-          <a:defRPr b="0" baseline="0" cap="none" i="0" spc="0" strike="noStrike" sz="1800" u="none" kumimoji="0" normalizeH="0">
+          <a:defRPr kumimoji="0" sz="1800" b="0" i="0" u="none" strike="noStrike" cap="none" spc="0" normalizeH="0" baseline="0">
             <a:ln>
               <a:noFill/>
             </a:ln>
@@ -6744,7 +6643,7 @@
           <a:buFontTx/>
           <a:buNone/>
           <a:tabLst/>
-          <a:defRPr b="0" baseline="0" cap="none" i="0" spc="0" strike="noStrike" sz="1800" u="none" kumimoji="0" normalizeH="0">
+          <a:defRPr kumimoji="0" sz="1800" b="0" i="0" u="none" strike="noStrike" cap="none" spc="0" normalizeH="0" baseline="0">
             <a:ln>
               <a:noFill/>
             </a:ln>
@@ -6770,7 +6669,7 @@
           <a:buFontTx/>
           <a:buNone/>
           <a:tabLst/>
-          <a:defRPr b="0" baseline="0" cap="none" i="0" spc="0" strike="noStrike" sz="1800" u="none" kumimoji="0" normalizeH="0">
+          <a:defRPr kumimoji="0" sz="1800" b="0" i="0" u="none" strike="noStrike" cap="none" spc="0" normalizeH="0" baseline="0">
             <a:ln>
               <a:noFill/>
             </a:ln>
@@ -6796,7 +6695,7 @@
           <a:buFontTx/>
           <a:buNone/>
           <a:tabLst/>
-          <a:defRPr b="0" baseline="0" cap="none" i="0" spc="0" strike="noStrike" sz="1800" u="none" kumimoji="0" normalizeH="0">
+          <a:defRPr kumimoji="0" sz="1800" b="0" i="0" u="none" strike="noStrike" cap="none" spc="0" normalizeH="0" baseline="0">
             <a:ln>
               <a:noFill/>
             </a:ln>
@@ -6822,7 +6721,7 @@
           <a:buFontTx/>
           <a:buNone/>
           <a:tabLst/>
-          <a:defRPr b="0" baseline="0" cap="none" i="0" spc="0" strike="noStrike" sz="1800" u="none" kumimoji="0" normalizeH="0">
+          <a:defRPr kumimoji="0" sz="1800" b="0" i="0" u="none" strike="noStrike" cap="none" spc="0" normalizeH="0" baseline="0">
             <a:ln>
               <a:noFill/>
             </a:ln>
@@ -6835,12 +6734,19 @@
         </a:lvl9pPr>
       </a:lstStyle>
       <a:style>
-        <a:lnRef idx="0"/>
-        <a:fillRef idx="0"/>
-        <a:effectRef idx="0"/>
+        <a:lnRef idx="0">
+          <a:scrgbClr r="0" g="0" b="0"/>
+        </a:lnRef>
+        <a:fillRef idx="0">
+          <a:scrgbClr r="0" g="0" b="0"/>
+        </a:fillRef>
+        <a:effectRef idx="0">
+          <a:scrgbClr r="0" g="0" b="0"/>
+        </a:effectRef>
         <a:fontRef idx="none"/>
       </a:style>
     </a:txDef>
   </a:objectDefaults>
+  <a:extraClrSchemeLst/>
 </a:theme>
 </file>
</xml_diff>